<commit_message>
changed the 4 point tranform function
</commit_message>
<xml_diff>
--- a/document_scanner.pptx
+++ b/document_scanner.pptx
@@ -10,6 +10,7 @@
     <p:sldId id="259" r:id="rId4"/>
     <p:sldId id="258" r:id="rId5"/>
     <p:sldId id="260" r:id="rId6"/>
+    <p:sldId id="261" r:id="rId7"/>
   </p:sldIdLst>
   <p:sldSz cx="12192000" cy="6858000"/>
   <p:notesSz cx="6858000" cy="9144000"/>
@@ -118,9 +119,13 @@
             <p14:sldId id="259"/>
             <p14:sldId id="258"/>
             <p14:sldId id="260"/>
+            <p14:sldId id="261"/>
           </p14:sldIdLst>
         </p14:section>
       </p14:sectionLst>
+    </p:ext>
+    <p:ext uri="{EFAFB233-063F-42B5-8137-9DF3F51BA10A}">
+      <p15:sldGuideLst xmlns:p15="http://schemas.microsoft.com/office/powerpoint/2012/main"/>
     </p:ext>
   </p:extLst>
 </p:presentation>
@@ -273,7 +278,7 @@
           <a:p>
             <a:fld id="{3E981CA3-87AD-4034-9902-765A519CB999}" type="datetimeFigureOut">
               <a:rPr lang="en-GB" smtClean="0"/>
-              <a:t>28/12/2023</a:t>
+              <a:t>31/12/2023</a:t>
             </a:fld>
             <a:endParaRPr lang="en-GB" dirty="0"/>
           </a:p>
@@ -471,7 +476,7 @@
           <a:p>
             <a:fld id="{3E981CA3-87AD-4034-9902-765A519CB999}" type="datetimeFigureOut">
               <a:rPr lang="en-GB" smtClean="0"/>
-              <a:t>28/12/2023</a:t>
+              <a:t>31/12/2023</a:t>
             </a:fld>
             <a:endParaRPr lang="en-GB" dirty="0"/>
           </a:p>
@@ -679,7 +684,7 @@
           <a:p>
             <a:fld id="{3E981CA3-87AD-4034-9902-765A519CB999}" type="datetimeFigureOut">
               <a:rPr lang="en-GB" smtClean="0"/>
-              <a:t>28/12/2023</a:t>
+              <a:t>31/12/2023</a:t>
             </a:fld>
             <a:endParaRPr lang="en-GB" dirty="0"/>
           </a:p>
@@ -877,7 +882,7 @@
           <a:p>
             <a:fld id="{3E981CA3-87AD-4034-9902-765A519CB999}" type="datetimeFigureOut">
               <a:rPr lang="en-GB" smtClean="0"/>
-              <a:t>28/12/2023</a:t>
+              <a:t>31/12/2023</a:t>
             </a:fld>
             <a:endParaRPr lang="en-GB" dirty="0"/>
           </a:p>
@@ -1152,7 +1157,7 @@
           <a:p>
             <a:fld id="{3E981CA3-87AD-4034-9902-765A519CB999}" type="datetimeFigureOut">
               <a:rPr lang="en-GB" smtClean="0"/>
-              <a:t>28/12/2023</a:t>
+              <a:t>31/12/2023</a:t>
             </a:fld>
             <a:endParaRPr lang="en-GB" dirty="0"/>
           </a:p>
@@ -1417,7 +1422,7 @@
           <a:p>
             <a:fld id="{3E981CA3-87AD-4034-9902-765A519CB999}" type="datetimeFigureOut">
               <a:rPr lang="en-GB" smtClean="0"/>
-              <a:t>28/12/2023</a:t>
+              <a:t>31/12/2023</a:t>
             </a:fld>
             <a:endParaRPr lang="en-GB" dirty="0"/>
           </a:p>
@@ -1829,7 +1834,7 @@
           <a:p>
             <a:fld id="{3E981CA3-87AD-4034-9902-765A519CB999}" type="datetimeFigureOut">
               <a:rPr lang="en-GB" smtClean="0"/>
-              <a:t>28/12/2023</a:t>
+              <a:t>31/12/2023</a:t>
             </a:fld>
             <a:endParaRPr lang="en-GB" dirty="0"/>
           </a:p>
@@ -1970,7 +1975,7 @@
           <a:p>
             <a:fld id="{3E981CA3-87AD-4034-9902-765A519CB999}" type="datetimeFigureOut">
               <a:rPr lang="en-GB" smtClean="0"/>
-              <a:t>28/12/2023</a:t>
+              <a:t>31/12/2023</a:t>
             </a:fld>
             <a:endParaRPr lang="en-GB" dirty="0"/>
           </a:p>
@@ -2083,7 +2088,7 @@
           <a:p>
             <a:fld id="{3E981CA3-87AD-4034-9902-765A519CB999}" type="datetimeFigureOut">
               <a:rPr lang="en-GB" smtClean="0"/>
-              <a:t>28/12/2023</a:t>
+              <a:t>31/12/2023</a:t>
             </a:fld>
             <a:endParaRPr lang="en-GB" dirty="0"/>
           </a:p>
@@ -2394,7 +2399,7 @@
           <a:p>
             <a:fld id="{3E981CA3-87AD-4034-9902-765A519CB999}" type="datetimeFigureOut">
               <a:rPr lang="en-GB" smtClean="0"/>
-              <a:t>28/12/2023</a:t>
+              <a:t>31/12/2023</a:t>
             </a:fld>
             <a:endParaRPr lang="en-GB" dirty="0"/>
           </a:p>
@@ -2682,7 +2687,7 @@
           <a:p>
             <a:fld id="{3E981CA3-87AD-4034-9902-765A519CB999}" type="datetimeFigureOut">
               <a:rPr lang="en-GB" smtClean="0"/>
-              <a:t>28/12/2023</a:t>
+              <a:t>31/12/2023</a:t>
             </a:fld>
             <a:endParaRPr lang="en-GB" dirty="0"/>
           </a:p>
@@ -2923,7 +2928,7 @@
           <a:p>
             <a:fld id="{3E981CA3-87AD-4034-9902-765A519CB999}" type="datetimeFigureOut">
               <a:rPr lang="en-GB" smtClean="0"/>
-              <a:t>28/12/2023</a:t>
+              <a:t>31/12/2023</a:t>
             </a:fld>
             <a:endParaRPr lang="en-GB" dirty="0"/>
           </a:p>
@@ -3326,6 +3331,14 @@
 <file path=ppt/slides/slide1.xml><?xml version="1.0" encoding="utf-8"?>
 <p:sld xmlns:a="http://schemas.openxmlformats.org/drawingml/2006/main" xmlns:r="http://schemas.openxmlformats.org/officeDocument/2006/relationships" xmlns:p="http://schemas.openxmlformats.org/presentationml/2006/main">
   <p:cSld>
+    <p:bg>
+      <p:bgPr>
+        <a:solidFill>
+          <a:schemeClr val="bg1"/>
+        </a:solidFill>
+        <a:effectLst/>
+      </p:bgPr>
+    </p:bg>
     <p:spTree>
       <p:nvGrpSpPr>
         <p:cNvPr id="1" name=""/>
@@ -3340,6 +3353,195 @@
           <a:chExt cx="0" cy="0"/>
         </a:xfrm>
       </p:grpSpPr>
+      <p:sp useBgFill="1">
+        <p:nvSpPr>
+          <p:cNvPr id="8" name="Rectangle 7">
+            <a:extLst>
+              <a:ext uri="{FF2B5EF4-FFF2-40B4-BE49-F238E27FC236}">
+                <a16:creationId xmlns:a16="http://schemas.microsoft.com/office/drawing/2014/main" id="{934F1179-B481-4F9E-BCA3-AFB972070F83}"/>
+              </a:ext>
+              <a:ext uri="{C183D7F6-B498-43B3-948B-1728B52AA6E4}">
+                <adec:decorative xmlns:adec="http://schemas.microsoft.com/office/drawing/2017/decorative" val="1"/>
+              </a:ext>
+            </a:extLst>
+          </p:cNvPr>
+          <p:cNvSpPr>
+            <a:spLocks noGrp="1" noRot="1" noChangeAspect="1" noMove="1" noResize="1" noEditPoints="1" noAdjustHandles="1" noChangeArrowheads="1" noChangeShapeType="1" noTextEdit="1"/>
+          </p:cNvSpPr>
+          <p:nvPr>
+            <p:extLst>
+              <p:ext uri="{386F3935-93C4-4BCD-93E2-E3B085C9AB24}">
+                <p16:designElem xmlns:p16="http://schemas.microsoft.com/office/powerpoint/2015/main" val="1"/>
+              </p:ext>
+            </p:extLst>
+          </p:nvPr>
+        </p:nvSpPr>
+        <p:spPr>
+          <a:xfrm>
+            <a:off x="0" y="0"/>
+            <a:ext cx="12192000" cy="6858000"/>
+          </a:xfrm>
+          <a:prstGeom prst="rect">
+            <a:avLst/>
+          </a:prstGeom>
+          <a:ln>
+            <a:noFill/>
+          </a:ln>
+        </p:spPr>
+        <p:style>
+          <a:lnRef idx="2">
+            <a:schemeClr val="accent1">
+              <a:shade val="50000"/>
+            </a:schemeClr>
+          </a:lnRef>
+          <a:fillRef idx="1">
+            <a:schemeClr val="accent1"/>
+          </a:fillRef>
+          <a:effectRef idx="0">
+            <a:schemeClr val="accent1"/>
+          </a:effectRef>
+          <a:fontRef idx="minor">
+            <a:schemeClr val="lt1"/>
+          </a:fontRef>
+        </p:style>
+        <p:txBody>
+          <a:bodyPr rtlCol="0" anchor="ctr"/>
+          <a:lstStyle/>
+          <a:p>
+            <a:pPr algn="ctr"/>
+            <a:endParaRPr lang="en-US" dirty="0"/>
+          </a:p>
+        </p:txBody>
+      </p:sp>
+      <p:sp>
+        <p:nvSpPr>
+          <p:cNvPr id="10" name="Right Triangle 9">
+            <a:extLst>
+              <a:ext uri="{FF2B5EF4-FFF2-40B4-BE49-F238E27FC236}">
+                <a16:creationId xmlns:a16="http://schemas.microsoft.com/office/drawing/2014/main" id="{827DC2C4-B485-428A-BF4A-472D2967F47F}"/>
+              </a:ext>
+              <a:ext uri="{C183D7F6-B498-43B3-948B-1728B52AA6E4}">
+                <adec:decorative xmlns:adec="http://schemas.microsoft.com/office/drawing/2017/decorative" val="1"/>
+              </a:ext>
+            </a:extLst>
+          </p:cNvPr>
+          <p:cNvSpPr>
+            <a:spLocks noGrp="1" noRot="1" noChangeAspect="1" noMove="1" noResize="1" noEditPoints="1" noAdjustHandles="1" noChangeArrowheads="1" noChangeShapeType="1" noTextEdit="1"/>
+          </p:cNvSpPr>
+          <p:nvPr>
+            <p:extLst>
+              <p:ext uri="{386F3935-93C4-4BCD-93E2-E3B085C9AB24}">
+                <p16:designElem xmlns:p16="http://schemas.microsoft.com/office/powerpoint/2015/main" val="1"/>
+              </p:ext>
+            </p:extLst>
+          </p:nvPr>
+        </p:nvSpPr>
+        <p:spPr>
+          <a:xfrm flipH="1">
+            <a:off x="8576720" y="3335867"/>
+            <a:ext cx="3291840" cy="3200400"/>
+          </a:xfrm>
+          <a:prstGeom prst="rtTriangle">
+            <a:avLst/>
+          </a:prstGeom>
+          <a:solidFill>
+            <a:schemeClr val="accent4"/>
+          </a:solidFill>
+          <a:ln>
+            <a:noFill/>
+          </a:ln>
+        </p:spPr>
+        <p:style>
+          <a:lnRef idx="2">
+            <a:schemeClr val="accent1">
+              <a:shade val="50000"/>
+            </a:schemeClr>
+          </a:lnRef>
+          <a:fillRef idx="1">
+            <a:schemeClr val="accent1"/>
+          </a:fillRef>
+          <a:effectRef idx="0">
+            <a:schemeClr val="accent1"/>
+          </a:effectRef>
+          <a:fontRef idx="minor">
+            <a:schemeClr val="lt1"/>
+          </a:fontRef>
+        </p:style>
+        <p:txBody>
+          <a:bodyPr rtlCol="0" anchor="ctr"/>
+          <a:lstStyle/>
+          <a:p>
+            <a:pPr algn="ctr"/>
+            <a:endParaRPr lang="en-US" dirty="0"/>
+          </a:p>
+        </p:txBody>
+      </p:sp>
+      <p:sp>
+        <p:nvSpPr>
+          <p:cNvPr id="12" name="Rectangle 11">
+            <a:extLst>
+              <a:ext uri="{FF2B5EF4-FFF2-40B4-BE49-F238E27FC236}">
+                <a16:creationId xmlns:a16="http://schemas.microsoft.com/office/drawing/2014/main" id="{EE04B5EB-F158-4507-90DD-BD23620C7CC9}"/>
+              </a:ext>
+              <a:ext uri="{C183D7F6-B498-43B3-948B-1728B52AA6E4}">
+                <adec:decorative xmlns:adec="http://schemas.microsoft.com/office/drawing/2017/decorative" val="1"/>
+              </a:ext>
+            </a:extLst>
+          </p:cNvPr>
+          <p:cNvSpPr>
+            <a:spLocks noGrp="1" noRot="1" noChangeAspect="1" noMove="1" noResize="1" noEditPoints="1" noAdjustHandles="1" noChangeArrowheads="1" noChangeShapeType="1" noTextEdit="1"/>
+          </p:cNvSpPr>
+          <p:nvPr>
+            <p:extLst>
+              <p:ext uri="{386F3935-93C4-4BCD-93E2-E3B085C9AB24}">
+                <p16:designElem xmlns:p16="http://schemas.microsoft.com/office/powerpoint/2015/main" val="1"/>
+              </p:ext>
+            </p:extLst>
+          </p:nvPr>
+        </p:nvSpPr>
+        <p:spPr>
+          <a:xfrm>
+            <a:off x="641774" y="623275"/>
+            <a:ext cx="10905053" cy="5607882"/>
+          </a:xfrm>
+          <a:prstGeom prst="rect">
+            <a:avLst/>
+          </a:prstGeom>
+          <a:noFill/>
+          <a:ln w="19050">
+            <a:solidFill>
+              <a:schemeClr val="tx1">
+                <a:lumMod val="75000"/>
+                <a:lumOff val="25000"/>
+              </a:schemeClr>
+            </a:solidFill>
+          </a:ln>
+        </p:spPr>
+        <p:style>
+          <a:lnRef idx="2">
+            <a:schemeClr val="accent1">
+              <a:shade val="50000"/>
+            </a:schemeClr>
+          </a:lnRef>
+          <a:fillRef idx="1">
+            <a:schemeClr val="accent1"/>
+          </a:fillRef>
+          <a:effectRef idx="0">
+            <a:schemeClr val="accent1"/>
+          </a:effectRef>
+          <a:fontRef idx="minor">
+            <a:schemeClr val="lt1"/>
+          </a:fontRef>
+        </p:style>
+        <p:txBody>
+          <a:bodyPr rtlCol="0" anchor="ctr"/>
+          <a:lstStyle/>
+          <a:p>
+            <a:pPr algn="ctr"/>
+            <a:endParaRPr lang="en-US" dirty="0"/>
+          </a:p>
+        </p:txBody>
+      </p:sp>
       <p:sp>
         <p:nvSpPr>
           <p:cNvPr id="2" name="Title 1">
@@ -3356,21 +3558,29 @@
             <p:ph type="ctrTitle"/>
           </p:nvPr>
         </p:nvSpPr>
-        <p:spPr/>
-        <p:txBody>
-          <a:bodyPr/>
-          <a:lstStyle/>
-          <a:p>
-            <a:r>
-              <a:rPr lang="en-GB" dirty="0"/>
+        <p:spPr>
+          <a:xfrm>
+            <a:off x="1285241" y="1008993"/>
+            <a:ext cx="9231410" cy="3542045"/>
+          </a:xfrm>
+        </p:spPr>
+        <p:txBody>
+          <a:bodyPr anchor="b">
+            <a:normAutofit/>
+          </a:bodyPr>
+          <a:lstStyle/>
+          <a:p>
+            <a:pPr algn="l"/>
+            <a:r>
+              <a:rPr lang="en-GB" sz="9600" b="1" dirty="0"/>
               <a:t>Document</a:t>
             </a:r>
             <a:r>
-              <a:rPr lang="pl-PL" dirty="0"/>
+              <a:rPr lang="pl-PL" sz="9600" b="1" dirty="0"/>
               <a:t> </a:t>
             </a:r>
             <a:r>
-              <a:rPr lang="en-GB" dirty="0"/>
+              <a:rPr lang="en-GB" sz="9600" b="1" dirty="0"/>
               <a:t>scanner</a:t>
             </a:r>
           </a:p>
@@ -3392,11 +3602,19 @@
             <p:ph type="subTitle" idx="1"/>
           </p:nvPr>
         </p:nvSpPr>
-        <p:spPr/>
-        <p:txBody>
-          <a:bodyPr/>
-          <a:lstStyle/>
-          <a:p>
+        <p:spPr>
+          <a:xfrm>
+            <a:off x="1285241" y="4582814"/>
+            <a:ext cx="7132335" cy="1312657"/>
+          </a:xfrm>
+        </p:spPr>
+        <p:txBody>
+          <a:bodyPr anchor="t">
+            <a:normAutofit/>
+          </a:bodyPr>
+          <a:lstStyle/>
+          <a:p>
+            <a:pPr algn="l"/>
             <a:r>
               <a:rPr lang="pl-PL" dirty="0"/>
               <a:t>Jerzy Pawlik</a:t>
@@ -3421,6 +3639,14 @@
 <file path=ppt/slides/slide2.xml><?xml version="1.0" encoding="utf-8"?>
 <p:sld xmlns:a="http://schemas.openxmlformats.org/drawingml/2006/main" xmlns:r="http://schemas.openxmlformats.org/officeDocument/2006/relationships" xmlns:p="http://schemas.openxmlformats.org/presentationml/2006/main">
   <p:cSld>
+    <p:bg>
+      <p:bgPr>
+        <a:solidFill>
+          <a:schemeClr val="bg1"/>
+        </a:solidFill>
+        <a:effectLst/>
+      </p:bgPr>
+    </p:bg>
     <p:spTree>
       <p:nvGrpSpPr>
         <p:cNvPr id="1" name=""/>
@@ -3435,6 +3661,382 @@
           <a:chExt cx="0" cy="0"/>
         </a:xfrm>
       </p:grpSpPr>
+      <p:sp useBgFill="1">
+        <p:nvSpPr>
+          <p:cNvPr id="8" name="Rectangle 7">
+            <a:extLst>
+              <a:ext uri="{FF2B5EF4-FFF2-40B4-BE49-F238E27FC236}">
+                <a16:creationId xmlns:a16="http://schemas.microsoft.com/office/drawing/2014/main" id="{081EA652-8C6A-4E69-BEB9-170809474553}"/>
+              </a:ext>
+              <a:ext uri="{C183D7F6-B498-43B3-948B-1728B52AA6E4}">
+                <adec:decorative xmlns:adec="http://schemas.microsoft.com/office/drawing/2017/decorative" val="1"/>
+              </a:ext>
+            </a:extLst>
+          </p:cNvPr>
+          <p:cNvSpPr>
+            <a:spLocks noGrp="1" noRot="1" noChangeAspect="1" noMove="1" noResize="1" noEditPoints="1" noAdjustHandles="1" noChangeArrowheads="1" noChangeShapeType="1" noTextEdit="1"/>
+          </p:cNvSpPr>
+          <p:nvPr>
+            <p:extLst>
+              <p:ext uri="{386F3935-93C4-4BCD-93E2-E3B085C9AB24}">
+                <p16:designElem xmlns:p16="http://schemas.microsoft.com/office/powerpoint/2015/main" val="1"/>
+              </p:ext>
+            </p:extLst>
+          </p:nvPr>
+        </p:nvSpPr>
+        <p:spPr>
+          <a:xfrm>
+            <a:off x="0" y="0"/>
+            <a:ext cx="12192000" cy="6858000"/>
+          </a:xfrm>
+          <a:prstGeom prst="rect">
+            <a:avLst/>
+          </a:prstGeom>
+          <a:ln>
+            <a:noFill/>
+          </a:ln>
+        </p:spPr>
+        <p:style>
+          <a:lnRef idx="2">
+            <a:schemeClr val="accent1">
+              <a:shade val="50000"/>
+            </a:schemeClr>
+          </a:lnRef>
+          <a:fillRef idx="1">
+            <a:schemeClr val="accent1"/>
+          </a:fillRef>
+          <a:effectRef idx="0">
+            <a:schemeClr val="accent1"/>
+          </a:effectRef>
+          <a:fontRef idx="minor">
+            <a:schemeClr val="lt1"/>
+          </a:fontRef>
+        </p:style>
+        <p:txBody>
+          <a:bodyPr rtlCol="0" anchor="ctr"/>
+          <a:lstStyle/>
+          <a:p>
+            <a:pPr algn="ctr"/>
+            <a:endParaRPr lang="en-US" dirty="0"/>
+          </a:p>
+        </p:txBody>
+      </p:sp>
+      <p:sp>
+        <p:nvSpPr>
+          <p:cNvPr id="10" name="Freeform: Shape 9">
+            <a:extLst>
+              <a:ext uri="{FF2B5EF4-FFF2-40B4-BE49-F238E27FC236}">
+                <a16:creationId xmlns:a16="http://schemas.microsoft.com/office/drawing/2014/main" id="{A4026A73-1F7F-49F2-B319-8CA3B3D53269}"/>
+              </a:ext>
+              <a:ext uri="{C183D7F6-B498-43B3-948B-1728B52AA6E4}">
+                <adec:decorative xmlns:adec="http://schemas.microsoft.com/office/drawing/2017/decorative" val="1"/>
+              </a:ext>
+            </a:extLst>
+          </p:cNvPr>
+          <p:cNvSpPr>
+            <a:spLocks noGrp="1" noRot="1" noChangeAspect="1" noMove="1" noResize="1" noEditPoints="1" noAdjustHandles="1" noChangeArrowheads="1" noChangeShapeType="1" noTextEdit="1"/>
+          </p:cNvSpPr>
+          <p:nvPr>
+            <p:extLst>
+              <p:ext uri="{386F3935-93C4-4BCD-93E2-E3B085C9AB24}">
+                <p16:designElem xmlns:p16="http://schemas.microsoft.com/office/powerpoint/2015/main" val="1"/>
+              </p:ext>
+            </p:extLst>
+          </p:nvPr>
+        </p:nvSpPr>
+        <p:spPr>
+          <a:xfrm>
+            <a:off x="321732" y="321733"/>
+            <a:ext cx="11546828" cy="6214534"/>
+          </a:xfrm>
+          <a:custGeom>
+            <a:avLst/>
+            <a:gdLst>
+              <a:gd name="connsiteX0" fmla="*/ 0 w 11546828"/>
+              <a:gd name="connsiteY0" fmla="*/ 0 h 6214534"/>
+              <a:gd name="connsiteX1" fmla="*/ 7965430 w 11546828"/>
+              <a:gd name="connsiteY1" fmla="*/ 0 h 6214534"/>
+              <a:gd name="connsiteX2" fmla="*/ 7965430 w 11546828"/>
+              <a:gd name="connsiteY2" fmla="*/ 1786 h 6214534"/>
+              <a:gd name="connsiteX3" fmla="*/ 11546828 w 11546828"/>
+              <a:gd name="connsiteY3" fmla="*/ 1786 h 6214534"/>
+              <a:gd name="connsiteX4" fmla="*/ 11546828 w 11546828"/>
+              <a:gd name="connsiteY4" fmla="*/ 2866740 h 6214534"/>
+              <a:gd name="connsiteX5" fmla="*/ 11225095 w 11546828"/>
+              <a:gd name="connsiteY5" fmla="*/ 3179536 h 6214534"/>
+              <a:gd name="connsiteX6" fmla="*/ 11225095 w 11546828"/>
+              <a:gd name="connsiteY6" fmla="*/ 301542 h 6214534"/>
+              <a:gd name="connsiteX7" fmla="*/ 320042 w 11546828"/>
+              <a:gd name="connsiteY7" fmla="*/ 301542 h 6214534"/>
+              <a:gd name="connsiteX8" fmla="*/ 320042 w 11546828"/>
+              <a:gd name="connsiteY8" fmla="*/ 5909424 h 6214534"/>
+              <a:gd name="connsiteX9" fmla="*/ 8417210 w 11546828"/>
+              <a:gd name="connsiteY9" fmla="*/ 5909424 h 6214534"/>
+              <a:gd name="connsiteX10" fmla="*/ 8103383 w 11546828"/>
+              <a:gd name="connsiteY10" fmla="*/ 6214534 h 6214534"/>
+              <a:gd name="connsiteX11" fmla="*/ 7222929 w 11546828"/>
+              <a:gd name="connsiteY11" fmla="*/ 6214534 h 6214534"/>
+              <a:gd name="connsiteX12" fmla="*/ 7222929 w 11546828"/>
+              <a:gd name="connsiteY12" fmla="*/ 6212748 h 6214534"/>
+              <a:gd name="connsiteX13" fmla="*/ 0 w 11546828"/>
+              <a:gd name="connsiteY13" fmla="*/ 6212748 h 6214534"/>
+            </a:gdLst>
+            <a:ahLst/>
+            <a:cxnLst>
+              <a:cxn ang="0">
+                <a:pos x="connsiteX0" y="connsiteY0"/>
+              </a:cxn>
+              <a:cxn ang="0">
+                <a:pos x="connsiteX1" y="connsiteY1"/>
+              </a:cxn>
+              <a:cxn ang="0">
+                <a:pos x="connsiteX2" y="connsiteY2"/>
+              </a:cxn>
+              <a:cxn ang="0">
+                <a:pos x="connsiteX3" y="connsiteY3"/>
+              </a:cxn>
+              <a:cxn ang="0">
+                <a:pos x="connsiteX4" y="connsiteY4"/>
+              </a:cxn>
+              <a:cxn ang="0">
+                <a:pos x="connsiteX5" y="connsiteY5"/>
+              </a:cxn>
+              <a:cxn ang="0">
+                <a:pos x="connsiteX6" y="connsiteY6"/>
+              </a:cxn>
+              <a:cxn ang="0">
+                <a:pos x="connsiteX7" y="connsiteY7"/>
+              </a:cxn>
+              <a:cxn ang="0">
+                <a:pos x="connsiteX8" y="connsiteY8"/>
+              </a:cxn>
+              <a:cxn ang="0">
+                <a:pos x="connsiteX9" y="connsiteY9"/>
+              </a:cxn>
+              <a:cxn ang="0">
+                <a:pos x="connsiteX10" y="connsiteY10"/>
+              </a:cxn>
+              <a:cxn ang="0">
+                <a:pos x="connsiteX11" y="connsiteY11"/>
+              </a:cxn>
+              <a:cxn ang="0">
+                <a:pos x="connsiteX12" y="connsiteY12"/>
+              </a:cxn>
+              <a:cxn ang="0">
+                <a:pos x="connsiteX13" y="connsiteY13"/>
+              </a:cxn>
+            </a:cxnLst>
+            <a:rect l="l" t="t" r="r" b="b"/>
+            <a:pathLst>
+              <a:path w="11546828" h="6214534">
+                <a:moveTo>
+                  <a:pt x="0" y="0"/>
+                </a:moveTo>
+                <a:lnTo>
+                  <a:pt x="7965430" y="0"/>
+                </a:lnTo>
+                <a:lnTo>
+                  <a:pt x="7965430" y="1786"/>
+                </a:lnTo>
+                <a:lnTo>
+                  <a:pt x="11546828" y="1786"/>
+                </a:lnTo>
+                <a:lnTo>
+                  <a:pt x="11546828" y="2866740"/>
+                </a:lnTo>
+                <a:lnTo>
+                  <a:pt x="11225095" y="3179536"/>
+                </a:lnTo>
+                <a:lnTo>
+                  <a:pt x="11225095" y="301542"/>
+                </a:lnTo>
+                <a:lnTo>
+                  <a:pt x="320042" y="301542"/>
+                </a:lnTo>
+                <a:lnTo>
+                  <a:pt x="320042" y="5909424"/>
+                </a:lnTo>
+                <a:lnTo>
+                  <a:pt x="8417210" y="5909424"/>
+                </a:lnTo>
+                <a:lnTo>
+                  <a:pt x="8103383" y="6214534"/>
+                </a:lnTo>
+                <a:lnTo>
+                  <a:pt x="7222929" y="6214534"/>
+                </a:lnTo>
+                <a:lnTo>
+                  <a:pt x="7222929" y="6212748"/>
+                </a:lnTo>
+                <a:lnTo>
+                  <a:pt x="0" y="6212748"/>
+                </a:lnTo>
+                <a:close/>
+              </a:path>
+            </a:pathLst>
+          </a:custGeom>
+          <a:solidFill>
+            <a:schemeClr val="tx1">
+              <a:lumMod val="50000"/>
+              <a:lumOff val="50000"/>
+              <a:alpha val="25000"/>
+            </a:schemeClr>
+          </a:solidFill>
+          <a:ln>
+            <a:noFill/>
+          </a:ln>
+        </p:spPr>
+        <p:style>
+          <a:lnRef idx="2">
+            <a:schemeClr val="accent1">
+              <a:shade val="50000"/>
+            </a:schemeClr>
+          </a:lnRef>
+          <a:fillRef idx="1">
+            <a:schemeClr val="accent1"/>
+          </a:fillRef>
+          <a:effectRef idx="0">
+            <a:schemeClr val="accent1"/>
+          </a:effectRef>
+          <a:fontRef idx="minor">
+            <a:schemeClr val="lt1"/>
+          </a:fontRef>
+        </p:style>
+        <p:txBody>
+          <a:bodyPr wrap="square" rtlCol="0" anchor="ctr">
+            <a:noAutofit/>
+          </a:bodyPr>
+          <a:lstStyle/>
+          <a:p>
+            <a:pPr algn="ctr"/>
+            <a:endParaRPr lang="en-US" dirty="0"/>
+          </a:p>
+        </p:txBody>
+      </p:sp>
+      <p:sp>
+        <p:nvSpPr>
+          <p:cNvPr id="12" name="Right Triangle 11">
+            <a:extLst>
+              <a:ext uri="{FF2B5EF4-FFF2-40B4-BE49-F238E27FC236}">
+                <a16:creationId xmlns:a16="http://schemas.microsoft.com/office/drawing/2014/main" id="{5298780A-33B9-4EA2-8F67-DE68AD62841B}"/>
+              </a:ext>
+              <a:ext uri="{C183D7F6-B498-43B3-948B-1728B52AA6E4}">
+                <adec:decorative xmlns:adec="http://schemas.microsoft.com/office/drawing/2017/decorative" val="1"/>
+              </a:ext>
+            </a:extLst>
+          </p:cNvPr>
+          <p:cNvSpPr>
+            <a:spLocks noGrp="1" noRot="1" noChangeAspect="1" noMove="1" noResize="1" noEditPoints="1" noAdjustHandles="1" noChangeArrowheads="1" noChangeShapeType="1" noTextEdit="1"/>
+          </p:cNvSpPr>
+          <p:nvPr>
+            <p:extLst>
+              <p:ext uri="{386F3935-93C4-4BCD-93E2-E3B085C9AB24}">
+                <p16:designElem xmlns:p16="http://schemas.microsoft.com/office/powerpoint/2015/main" val="1"/>
+              </p:ext>
+            </p:extLst>
+          </p:nvPr>
+        </p:nvSpPr>
+        <p:spPr>
+          <a:xfrm flipH="1">
+            <a:off x="8576720" y="3335867"/>
+            <a:ext cx="3291840" cy="3200400"/>
+          </a:xfrm>
+          <a:prstGeom prst="rtTriangle">
+            <a:avLst/>
+          </a:prstGeom>
+          <a:solidFill>
+            <a:schemeClr val="accent4"/>
+          </a:solidFill>
+          <a:ln>
+            <a:noFill/>
+          </a:ln>
+        </p:spPr>
+        <p:style>
+          <a:lnRef idx="2">
+            <a:schemeClr val="accent1">
+              <a:shade val="50000"/>
+            </a:schemeClr>
+          </a:lnRef>
+          <a:fillRef idx="1">
+            <a:schemeClr val="accent1"/>
+          </a:fillRef>
+          <a:effectRef idx="0">
+            <a:schemeClr val="accent1"/>
+          </a:effectRef>
+          <a:fontRef idx="minor">
+            <a:schemeClr val="lt1"/>
+          </a:fontRef>
+        </p:style>
+        <p:txBody>
+          <a:bodyPr rtlCol="0" anchor="ctr"/>
+          <a:lstStyle/>
+          <a:p>
+            <a:pPr algn="ctr"/>
+            <a:endParaRPr lang="en-US" dirty="0"/>
+          </a:p>
+        </p:txBody>
+      </p:sp>
+      <p:sp>
+        <p:nvSpPr>
+          <p:cNvPr id="14" name="Rectangle 13">
+            <a:extLst>
+              <a:ext uri="{FF2B5EF4-FFF2-40B4-BE49-F238E27FC236}">
+                <a16:creationId xmlns:a16="http://schemas.microsoft.com/office/drawing/2014/main" id="{7F488E8B-4E1E-4402-8935-D4E6C02615C7}"/>
+              </a:ext>
+              <a:ext uri="{C183D7F6-B498-43B3-948B-1728B52AA6E4}">
+                <adec:decorative xmlns:adec="http://schemas.microsoft.com/office/drawing/2017/decorative" val="1"/>
+              </a:ext>
+            </a:extLst>
+          </p:cNvPr>
+          <p:cNvSpPr>
+            <a:spLocks noGrp="1" noRot="1" noChangeAspect="1" noMove="1" noResize="1" noEditPoints="1" noAdjustHandles="1" noChangeArrowheads="1" noChangeShapeType="1" noTextEdit="1"/>
+          </p:cNvSpPr>
+          <p:nvPr>
+            <p:extLst>
+              <p:ext uri="{386F3935-93C4-4BCD-93E2-E3B085C9AB24}">
+                <p16:designElem xmlns:p16="http://schemas.microsoft.com/office/powerpoint/2015/main" val="1"/>
+              </p:ext>
+            </p:extLst>
+          </p:nvPr>
+        </p:nvSpPr>
+        <p:spPr>
+          <a:xfrm>
+            <a:off x="641774" y="623275"/>
+            <a:ext cx="10905053" cy="5607882"/>
+          </a:xfrm>
+          <a:prstGeom prst="rect">
+            <a:avLst/>
+          </a:prstGeom>
+          <a:noFill/>
+          <a:ln w="19050">
+            <a:noFill/>
+          </a:ln>
+        </p:spPr>
+        <p:style>
+          <a:lnRef idx="2">
+            <a:schemeClr val="accent1">
+              <a:shade val="50000"/>
+            </a:schemeClr>
+          </a:lnRef>
+          <a:fillRef idx="1">
+            <a:schemeClr val="accent1"/>
+          </a:fillRef>
+          <a:effectRef idx="0">
+            <a:schemeClr val="accent1"/>
+          </a:effectRef>
+          <a:fontRef idx="minor">
+            <a:schemeClr val="lt1"/>
+          </a:fontRef>
+        </p:style>
+        <p:txBody>
+          <a:bodyPr rtlCol="0" anchor="ctr"/>
+          <a:lstStyle/>
+          <a:p>
+            <a:pPr algn="ctr"/>
+            <a:endParaRPr lang="en-US" dirty="0"/>
+          </a:p>
+        </p:txBody>
+      </p:sp>
       <p:sp>
         <p:nvSpPr>
           <p:cNvPr id="2" name="Title 1">
@@ -3451,26 +4053,89 @@
             <p:ph type="title"/>
           </p:nvPr>
         </p:nvSpPr>
-        <p:spPr/>
-        <p:txBody>
-          <a:bodyPr/>
-          <a:lstStyle/>
-          <a:p>
-            <a:r>
-              <a:rPr lang="pl-PL" dirty="0"/>
+        <p:spPr>
+          <a:xfrm>
+            <a:off x="1006900" y="1188637"/>
+            <a:ext cx="3141430" cy="4480726"/>
+          </a:xfrm>
+        </p:spPr>
+        <p:txBody>
+          <a:bodyPr>
+            <a:normAutofit/>
+          </a:bodyPr>
+          <a:lstStyle/>
+          <a:p>
+            <a:pPr algn="r"/>
+            <a:r>
+              <a:rPr lang="pl-PL" sz="5600" dirty="0"/>
               <a:t>P</a:t>
             </a:r>
             <a:r>
-              <a:rPr lang="en-GB" dirty="0" err="1"/>
+              <a:rPr lang="en-GB" sz="5600" dirty="0" err="1"/>
               <a:t>roblem</a:t>
             </a:r>
             <a:r>
-              <a:rPr lang="en-GB" dirty="0"/>
+              <a:rPr lang="en-GB" sz="5600" dirty="0"/>
               <a:t> definition</a:t>
             </a:r>
           </a:p>
         </p:txBody>
       </p:sp>
+      <p:cxnSp>
+        <p:nvCxnSpPr>
+          <p:cNvPr id="16" name="Straight Connector 15">
+            <a:extLst>
+              <a:ext uri="{FF2B5EF4-FFF2-40B4-BE49-F238E27FC236}">
+                <a16:creationId xmlns:a16="http://schemas.microsoft.com/office/drawing/2014/main" id="{23AAC9B5-8015-485C-ACF9-A750390E9A56}"/>
+              </a:ext>
+              <a:ext uri="{C183D7F6-B498-43B3-948B-1728B52AA6E4}">
+                <adec:decorative xmlns:adec="http://schemas.microsoft.com/office/drawing/2017/decorative" val="1"/>
+              </a:ext>
+            </a:extLst>
+          </p:cNvPr>
+          <p:cNvCxnSpPr>
+            <a:cxnSpLocks noGrp="1" noRot="1" noChangeAspect="1" noMove="1" noResize="1" noEditPoints="1" noAdjustHandles="1" noChangeArrowheads="1" noChangeShapeType="1"/>
+          </p:cNvCxnSpPr>
+          <p:nvPr>
+            <p:extLst>
+              <p:ext uri="{386F3935-93C4-4BCD-93E2-E3B085C9AB24}">
+                <p16:designElem xmlns:p16="http://schemas.microsoft.com/office/powerpoint/2015/main" val="1"/>
+              </p:ext>
+            </p:extLst>
+          </p:nvPr>
+        </p:nvCxnSpPr>
+        <p:spPr>
+          <a:xfrm>
+            <a:off x="4654296" y="1852863"/>
+            <a:ext cx="0" cy="3236495"/>
+          </a:xfrm>
+          <a:prstGeom prst="line">
+            <a:avLst/>
+          </a:prstGeom>
+          <a:ln w="19050" cap="sq">
+            <a:solidFill>
+              <a:schemeClr val="tx1">
+                <a:lumMod val="75000"/>
+                <a:lumOff val="25000"/>
+              </a:schemeClr>
+            </a:solidFill>
+          </a:ln>
+        </p:spPr>
+        <p:style>
+          <a:lnRef idx="1">
+            <a:schemeClr val="accent1"/>
+          </a:lnRef>
+          <a:fillRef idx="0">
+            <a:schemeClr val="accent1"/>
+          </a:fillRef>
+          <a:effectRef idx="0">
+            <a:schemeClr val="accent1"/>
+          </a:effectRef>
+          <a:fontRef idx="minor">
+            <a:schemeClr val="tx1"/>
+          </a:fontRef>
+        </p:style>
+      </p:cxnSp>
       <p:sp>
         <p:nvSpPr>
           <p:cNvPr id="3" name="Content Placeholder 2">
@@ -3487,199 +4152,26 @@
             <p:ph idx="1"/>
           </p:nvPr>
         </p:nvSpPr>
-        <p:spPr/>
-        <p:txBody>
-          <a:bodyPr/>
+        <p:spPr>
+          <a:xfrm>
+            <a:off x="5138928" y="1338729"/>
+            <a:ext cx="4795584" cy="4180542"/>
+          </a:xfrm>
+        </p:spPr>
+        <p:txBody>
+          <a:bodyPr anchor="ctr">
+            <a:normAutofit/>
+          </a:bodyPr>
           <a:lstStyle/>
           <a:p>
             <a:pPr marL="0" indent="0">
               <a:buNone/>
             </a:pPr>
             <a:r>
-              <a:rPr lang="pl-PL" dirty="0" err="1"/>
-              <a:t>Creating</a:t>
-            </a:r>
-            <a:r>
-              <a:rPr lang="pl-PL" dirty="0"/>
-              <a:t> a </a:t>
-            </a:r>
-            <a:r>
-              <a:rPr lang="pl-PL" dirty="0" err="1"/>
-              <a:t>document</a:t>
-            </a:r>
-            <a:r>
-              <a:rPr lang="pl-PL" dirty="0"/>
-              <a:t> </a:t>
-            </a:r>
-            <a:r>
-              <a:rPr lang="pl-PL" dirty="0" err="1"/>
-              <a:t>scanner</a:t>
-            </a:r>
-            <a:r>
-              <a:rPr lang="pl-PL" dirty="0"/>
-              <a:t>, </a:t>
-            </a:r>
-            <a:r>
-              <a:rPr lang="pl-PL" dirty="0" err="1"/>
-              <a:t>that</a:t>
-            </a:r>
-            <a:r>
-              <a:rPr lang="pl-PL" dirty="0"/>
-              <a:t> </a:t>
-            </a:r>
-            <a:r>
-              <a:rPr lang="pl-PL" dirty="0" err="1"/>
-              <a:t>can</a:t>
-            </a:r>
-            <a:r>
-              <a:rPr lang="pl-PL" dirty="0"/>
-              <a:t> </a:t>
-            </a:r>
-            <a:r>
-              <a:rPr lang="pl-PL" dirty="0" err="1"/>
-              <a:t>use</a:t>
-            </a:r>
-            <a:r>
-              <a:rPr lang="pl-PL" dirty="0"/>
-              <a:t>  a laptop </a:t>
-            </a:r>
-            <a:r>
-              <a:rPr lang="pl-PL" dirty="0" err="1"/>
-              <a:t>camera</a:t>
-            </a:r>
-            <a:r>
-              <a:rPr lang="pl-PL" dirty="0"/>
-              <a:t> to </a:t>
-            </a:r>
-            <a:r>
-              <a:rPr lang="pl-PL" dirty="0" err="1"/>
-              <a:t>find</a:t>
-            </a:r>
-            <a:r>
-              <a:rPr lang="pl-PL" dirty="0"/>
-              <a:t> the </a:t>
-            </a:r>
-            <a:r>
-              <a:rPr lang="pl-PL" dirty="0" err="1"/>
-              <a:t>document</a:t>
-            </a:r>
-            <a:r>
-              <a:rPr lang="pl-PL" dirty="0"/>
-              <a:t> on the </a:t>
-            </a:r>
-            <a:r>
-              <a:rPr lang="pl-PL" dirty="0" err="1"/>
-              <a:t>camera</a:t>
-            </a:r>
-            <a:r>
-              <a:rPr lang="pl-PL" dirty="0"/>
-              <a:t> </a:t>
-            </a:r>
-            <a:r>
-              <a:rPr lang="pl-PL" dirty="0" err="1"/>
-              <a:t>view</a:t>
-            </a:r>
-            <a:r>
-              <a:rPr lang="pl-PL" dirty="0"/>
-              <a:t>, </a:t>
-            </a:r>
-            <a:r>
-              <a:rPr lang="pl-PL" dirty="0" err="1"/>
-              <a:t>then</a:t>
-            </a:r>
-            <a:r>
-              <a:rPr lang="pl-PL" dirty="0"/>
-              <a:t> </a:t>
-            </a:r>
-            <a:r>
-              <a:rPr lang="pl-PL" dirty="0" err="1"/>
-              <a:t>extract</a:t>
-            </a:r>
-            <a:r>
-              <a:rPr lang="pl-PL" dirty="0"/>
-              <a:t> </a:t>
-            </a:r>
-            <a:r>
-              <a:rPr lang="pl-PL" dirty="0" err="1"/>
-              <a:t>it</a:t>
-            </a:r>
-            <a:r>
-              <a:rPr lang="pl-PL" dirty="0"/>
-              <a:t> from </a:t>
-            </a:r>
-            <a:r>
-              <a:rPr lang="pl-PL" dirty="0" err="1"/>
-              <a:t>there</a:t>
-            </a:r>
-            <a:r>
-              <a:rPr lang="pl-PL" dirty="0"/>
-              <a:t> </a:t>
-            </a:r>
-            <a:r>
-              <a:rPr lang="pl-PL" dirty="0" err="1"/>
-              <a:t>into</a:t>
-            </a:r>
-            <a:r>
-              <a:rPr lang="pl-PL" dirty="0"/>
-              <a:t> the </a:t>
-            </a:r>
-            <a:r>
-              <a:rPr lang="pl-PL" dirty="0" err="1"/>
-              <a:t>new</a:t>
-            </a:r>
-            <a:r>
-              <a:rPr lang="pl-PL" dirty="0"/>
-              <a:t> file, and </a:t>
-            </a:r>
-            <a:r>
-              <a:rPr lang="pl-PL" dirty="0" err="1"/>
-              <a:t>binarize</a:t>
-            </a:r>
-            <a:r>
-              <a:rPr lang="pl-PL" dirty="0"/>
-              <a:t> </a:t>
-            </a:r>
-            <a:r>
-              <a:rPr lang="pl-PL" dirty="0" err="1"/>
-              <a:t>it</a:t>
-            </a:r>
-            <a:r>
-              <a:rPr lang="pl-PL" dirty="0"/>
-              <a:t> to </a:t>
-            </a:r>
-            <a:r>
-              <a:rPr lang="pl-PL" dirty="0" err="1"/>
-              <a:t>make</a:t>
-            </a:r>
-            <a:r>
-              <a:rPr lang="pl-PL" dirty="0"/>
-              <a:t> </a:t>
-            </a:r>
-            <a:r>
-              <a:rPr lang="pl-PL" dirty="0" err="1"/>
-              <a:t>it</a:t>
-            </a:r>
-            <a:r>
-              <a:rPr lang="pl-PL" dirty="0"/>
-              <a:t> </a:t>
-            </a:r>
-            <a:r>
-              <a:rPr lang="pl-PL" dirty="0" err="1"/>
-              <a:t>easier</a:t>
-            </a:r>
-            <a:r>
-              <a:rPr lang="pl-PL" dirty="0"/>
-              <a:t> to </a:t>
-            </a:r>
-            <a:r>
-              <a:rPr lang="pl-PL" dirty="0" err="1"/>
-              <a:t>read</a:t>
-            </a:r>
-            <a:r>
-              <a:rPr lang="pl-PL" dirty="0"/>
-              <a:t>. </a:t>
-            </a:r>
-            <a:endParaRPr lang="en-GB" dirty="0"/>
+              <a:rPr lang="pl-PL" sz="2400"/>
+              <a:t>Creating a document scanner, that can use  a laptop camera to find the document on the camera view, then extract it from there into the new file, and binarize it to make it easier to read. The output image is black and white.</a:t>
+            </a:r>
+            <a:endParaRPr lang="en-GB" sz="2400"/>
           </a:p>
         </p:txBody>
       </p:sp>
@@ -3699,6 +4191,14 @@
 <file path=ppt/slides/slide3.xml><?xml version="1.0" encoding="utf-8"?>
 <p:sld xmlns:a="http://schemas.openxmlformats.org/drawingml/2006/main" xmlns:r="http://schemas.openxmlformats.org/officeDocument/2006/relationships" xmlns:p="http://schemas.openxmlformats.org/presentationml/2006/main">
   <p:cSld>
+    <p:bg>
+      <p:bgPr>
+        <a:solidFill>
+          <a:schemeClr val="bg1"/>
+        </a:solidFill>
+        <a:effectLst/>
+      </p:bgPr>
+    </p:bg>
     <p:spTree>
       <p:nvGrpSpPr>
         <p:cNvPr id="1" name=""/>
@@ -3713,6 +4213,195 @@
           <a:chExt cx="0" cy="0"/>
         </a:xfrm>
       </p:grpSpPr>
+      <p:sp useBgFill="1">
+        <p:nvSpPr>
+          <p:cNvPr id="9" name="Rectangle 8">
+            <a:extLst>
+              <a:ext uri="{FF2B5EF4-FFF2-40B4-BE49-F238E27FC236}">
+                <a16:creationId xmlns:a16="http://schemas.microsoft.com/office/drawing/2014/main" id="{081EA652-8C6A-4E69-BEB9-170809474553}"/>
+              </a:ext>
+              <a:ext uri="{C183D7F6-B498-43B3-948B-1728B52AA6E4}">
+                <adec:decorative xmlns:adec="http://schemas.microsoft.com/office/drawing/2017/decorative" val="1"/>
+              </a:ext>
+            </a:extLst>
+          </p:cNvPr>
+          <p:cNvSpPr>
+            <a:spLocks noGrp="1" noRot="1" noChangeAspect="1" noMove="1" noResize="1" noEditPoints="1" noAdjustHandles="1" noChangeArrowheads="1" noChangeShapeType="1" noTextEdit="1"/>
+          </p:cNvSpPr>
+          <p:nvPr>
+            <p:extLst>
+              <p:ext uri="{386F3935-93C4-4BCD-93E2-E3B085C9AB24}">
+                <p16:designElem xmlns:p16="http://schemas.microsoft.com/office/powerpoint/2015/main" val="1"/>
+              </p:ext>
+            </p:extLst>
+          </p:nvPr>
+        </p:nvSpPr>
+        <p:spPr>
+          <a:xfrm>
+            <a:off x="0" y="0"/>
+            <a:ext cx="12192000" cy="6858000"/>
+          </a:xfrm>
+          <a:prstGeom prst="rect">
+            <a:avLst/>
+          </a:prstGeom>
+          <a:ln>
+            <a:noFill/>
+          </a:ln>
+        </p:spPr>
+        <p:style>
+          <a:lnRef idx="2">
+            <a:schemeClr val="accent1">
+              <a:shade val="50000"/>
+            </a:schemeClr>
+          </a:lnRef>
+          <a:fillRef idx="1">
+            <a:schemeClr val="accent1"/>
+          </a:fillRef>
+          <a:effectRef idx="0">
+            <a:schemeClr val="accent1"/>
+          </a:effectRef>
+          <a:fontRef idx="minor">
+            <a:schemeClr val="lt1"/>
+          </a:fontRef>
+        </p:style>
+        <p:txBody>
+          <a:bodyPr rtlCol="0" anchor="ctr"/>
+          <a:lstStyle/>
+          <a:p>
+            <a:pPr algn="ctr"/>
+            <a:endParaRPr lang="en-US"/>
+          </a:p>
+        </p:txBody>
+      </p:sp>
+      <p:sp>
+        <p:nvSpPr>
+          <p:cNvPr id="11" name="Right Triangle 10">
+            <a:extLst>
+              <a:ext uri="{FF2B5EF4-FFF2-40B4-BE49-F238E27FC236}">
+                <a16:creationId xmlns:a16="http://schemas.microsoft.com/office/drawing/2014/main" id="{5298780A-33B9-4EA2-8F67-DE68AD62841B}"/>
+              </a:ext>
+              <a:ext uri="{C183D7F6-B498-43B3-948B-1728B52AA6E4}">
+                <adec:decorative xmlns:adec="http://schemas.microsoft.com/office/drawing/2017/decorative" val="1"/>
+              </a:ext>
+            </a:extLst>
+          </p:cNvPr>
+          <p:cNvSpPr>
+            <a:spLocks noGrp="1" noRot="1" noChangeAspect="1" noMove="1" noResize="1" noEditPoints="1" noAdjustHandles="1" noChangeArrowheads="1" noChangeShapeType="1" noTextEdit="1"/>
+          </p:cNvSpPr>
+          <p:nvPr>
+            <p:extLst>
+              <p:ext uri="{386F3935-93C4-4BCD-93E2-E3B085C9AB24}">
+                <p16:designElem xmlns:p16="http://schemas.microsoft.com/office/powerpoint/2015/main" val="1"/>
+              </p:ext>
+            </p:extLst>
+          </p:nvPr>
+        </p:nvSpPr>
+        <p:spPr>
+          <a:xfrm flipH="1">
+            <a:off x="8576720" y="3335867"/>
+            <a:ext cx="3291840" cy="3200400"/>
+          </a:xfrm>
+          <a:prstGeom prst="rtTriangle">
+            <a:avLst/>
+          </a:prstGeom>
+          <a:solidFill>
+            <a:schemeClr val="accent4"/>
+          </a:solidFill>
+          <a:ln>
+            <a:noFill/>
+          </a:ln>
+        </p:spPr>
+        <p:style>
+          <a:lnRef idx="2">
+            <a:schemeClr val="accent1">
+              <a:shade val="50000"/>
+            </a:schemeClr>
+          </a:lnRef>
+          <a:fillRef idx="1">
+            <a:schemeClr val="accent1"/>
+          </a:fillRef>
+          <a:effectRef idx="0">
+            <a:schemeClr val="accent1"/>
+          </a:effectRef>
+          <a:fontRef idx="minor">
+            <a:schemeClr val="lt1"/>
+          </a:fontRef>
+        </p:style>
+        <p:txBody>
+          <a:bodyPr rtlCol="0" anchor="ctr"/>
+          <a:lstStyle/>
+          <a:p>
+            <a:pPr algn="ctr"/>
+            <a:endParaRPr lang="en-US" dirty="0"/>
+          </a:p>
+        </p:txBody>
+      </p:sp>
+      <p:sp>
+        <p:nvSpPr>
+          <p:cNvPr id="13" name="Rectangle 12">
+            <a:extLst>
+              <a:ext uri="{FF2B5EF4-FFF2-40B4-BE49-F238E27FC236}">
+                <a16:creationId xmlns:a16="http://schemas.microsoft.com/office/drawing/2014/main" id="{7F488E8B-4E1E-4402-8935-D4E6C02615C7}"/>
+              </a:ext>
+              <a:ext uri="{C183D7F6-B498-43B3-948B-1728B52AA6E4}">
+                <adec:decorative xmlns:adec="http://schemas.microsoft.com/office/drawing/2017/decorative" val="1"/>
+              </a:ext>
+            </a:extLst>
+          </p:cNvPr>
+          <p:cNvSpPr>
+            <a:spLocks noGrp="1" noRot="1" noChangeAspect="1" noMove="1" noResize="1" noEditPoints="1" noAdjustHandles="1" noChangeArrowheads="1" noChangeShapeType="1" noTextEdit="1"/>
+          </p:cNvSpPr>
+          <p:nvPr>
+            <p:extLst>
+              <p:ext uri="{386F3935-93C4-4BCD-93E2-E3B085C9AB24}">
+                <p16:designElem xmlns:p16="http://schemas.microsoft.com/office/powerpoint/2015/main" val="1"/>
+              </p:ext>
+            </p:extLst>
+          </p:nvPr>
+        </p:nvSpPr>
+        <p:spPr>
+          <a:xfrm>
+            <a:off x="641774" y="623275"/>
+            <a:ext cx="10905053" cy="5607882"/>
+          </a:xfrm>
+          <a:prstGeom prst="rect">
+            <a:avLst/>
+          </a:prstGeom>
+          <a:noFill/>
+          <a:ln w="19050">
+            <a:solidFill>
+              <a:schemeClr val="tx1">
+                <a:lumMod val="75000"/>
+                <a:lumOff val="25000"/>
+              </a:schemeClr>
+            </a:solidFill>
+          </a:ln>
+        </p:spPr>
+        <p:style>
+          <a:lnRef idx="2">
+            <a:schemeClr val="accent1">
+              <a:shade val="50000"/>
+            </a:schemeClr>
+          </a:lnRef>
+          <a:fillRef idx="1">
+            <a:schemeClr val="accent1"/>
+          </a:fillRef>
+          <a:effectRef idx="0">
+            <a:schemeClr val="accent1"/>
+          </a:effectRef>
+          <a:fontRef idx="minor">
+            <a:schemeClr val="lt1"/>
+          </a:fontRef>
+        </p:style>
+        <p:txBody>
+          <a:bodyPr rtlCol="0" anchor="ctr"/>
+          <a:lstStyle/>
+          <a:p>
+            <a:pPr algn="ctr"/>
+            <a:endParaRPr lang="en-US"/>
+          </a:p>
+        </p:txBody>
+      </p:sp>
       <p:sp>
         <p:nvSpPr>
           <p:cNvPr id="2" name="Title 1">
@@ -3729,28 +4418,48 @@
             <p:ph type="title"/>
           </p:nvPr>
         </p:nvSpPr>
-        <p:spPr/>
-        <p:txBody>
-          <a:bodyPr/>
-          <a:lstStyle/>
-          <a:p>
-            <a:r>
-              <a:rPr lang="pl-PL" dirty="0"/>
-              <a:t>The </a:t>
-            </a:r>
-            <a:r>
-              <a:rPr lang="pl-PL" dirty="0" err="1"/>
-              <a:t>pipeline</a:t>
-            </a:r>
-            <a:r>
-              <a:rPr lang="pl-PL" dirty="0"/>
-              <a:t> of the </a:t>
-            </a:r>
-            <a:r>
-              <a:rPr lang="pl-PL" dirty="0" err="1"/>
-              <a:t>project</a:t>
-            </a:r>
-            <a:endParaRPr lang="en-GB" dirty="0"/>
+        <p:spPr>
+          <a:xfrm>
+            <a:off x="677374" y="666192"/>
+            <a:ext cx="10449538" cy="727051"/>
+          </a:xfrm>
+        </p:spPr>
+        <p:txBody>
+          <a:bodyPr anchor="ctr">
+            <a:normAutofit/>
+          </a:bodyPr>
+          <a:lstStyle/>
+          <a:p>
+            <a:r>
+              <a:rPr lang="en-GB" sz="4000" b="1" dirty="0">
+                <a:solidFill>
+                  <a:schemeClr val="bg2">
+                    <a:lumMod val="50000"/>
+                  </a:schemeClr>
+                </a:solidFill>
+              </a:rPr>
+              <a:t>The pipeline of the project</a:t>
+            </a:r>
+            <a:r>
+              <a:rPr lang="pl-PL" sz="4000" b="1" dirty="0">
+                <a:solidFill>
+                  <a:schemeClr val="bg2">
+                    <a:lumMod val="50000"/>
+                  </a:schemeClr>
+                </a:solidFill>
+              </a:rPr>
+              <a:t> </a:t>
+            </a:r>
+            <a:r>
+              <a:rPr lang="en-GB" sz="4000" b="1" dirty="0">
+                <a:solidFill>
+                  <a:schemeClr val="bg2">
+                    <a:lumMod val="50000"/>
+                  </a:schemeClr>
+                </a:solidFill>
+              </a:rPr>
+              <a:t>(system architecture)</a:t>
+            </a:r>
           </a:p>
         </p:txBody>
       </p:sp>
@@ -3770,14 +4479,14 @@
             <p:ph idx="1"/>
             <p:extLst>
               <p:ext uri="{D42A27DB-BD31-4B8C-83A1-F6EECF244321}">
-                <p14:modId xmlns:p14="http://schemas.microsoft.com/office/powerpoint/2010/main" val="1603581189"/>
+                <p14:modId xmlns:p14="http://schemas.microsoft.com/office/powerpoint/2010/main" val="2340562901"/>
               </p:ext>
             </p:extLst>
           </p:nvPr>
         </p:nvGraphicFramePr>
         <p:xfrm>
-          <a:off x="838200" y="1825625"/>
-          <a:ext cx="10515600" cy="3032760"/>
+          <a:off x="677373" y="1393244"/>
+          <a:ext cx="10869454" cy="4329462"/>
         </p:xfrm>
         <a:graphic>
           <a:graphicData uri="http://schemas.openxmlformats.org/drawingml/2006/table">
@@ -3786,14 +4495,21 @@
                 <a:tableStyleId>{5C22544A-7EE6-4342-B048-85BDC9FD1C3A}</a:tableStyleId>
               </a:tblPr>
               <a:tblGrid>
-                <a:gridCol w="5257800">
+                <a:gridCol w="548232">
                   <a:extLst>
                     <a:ext uri="{9D8B030D-6E8A-4147-A177-3AD203B41FA5}">
                       <a16:colId xmlns:a16="http://schemas.microsoft.com/office/drawing/2014/main" val="1001652242"/>
                     </a:ext>
                   </a:extLst>
                 </a:gridCol>
-                <a:gridCol w="5257800">
+                <a:gridCol w="4590765">
+                  <a:extLst>
+                    <a:ext uri="{9D8B030D-6E8A-4147-A177-3AD203B41FA5}">
+                      <a16:colId xmlns:a16="http://schemas.microsoft.com/office/drawing/2014/main" val="3173540601"/>
+                    </a:ext>
+                  </a:extLst>
+                </a:gridCol>
+                <a:gridCol w="5730457">
                   <a:extLst>
                     <a:ext uri="{9D8B030D-6E8A-4147-A177-3AD203B41FA5}">
                       <a16:colId xmlns:a16="http://schemas.microsoft.com/office/drawing/2014/main" val="3439392661"/>
@@ -3801,143 +4517,50 @@
                   </a:extLst>
                 </a:gridCol>
               </a:tblGrid>
-              <a:tr h="370840">
+              <a:tr h="928716">
                 <a:tc>
                   <a:txBody>
                     <a:bodyPr/>
                     <a:lstStyle/>
                     <a:p>
-                      <a:pPr marL="342900" indent="-342900">
+                      <a:pPr marL="0" indent="0" algn="ctr">
                         <a:buFont typeface="+mj-lt"/>
-                        <a:buAutoNum type="arabicPeriod"/>
+                        <a:buNone/>
                       </a:pPr>
                       <a:r>
-                        <a:rPr lang="pl-PL" dirty="0" err="1">
+                        <a:rPr lang="en-GB" sz="4800" b="1" noProof="0" dirty="0">
                           <a:solidFill>
-                            <a:schemeClr val="tx1"/>
+                            <a:schemeClr val="accent4"/>
                           </a:solidFill>
                         </a:rPr>
-                        <a:t>Setting</a:t>
+                        <a:t>1</a:t>
                       </a:r>
-                      <a:r>
-                        <a:rPr lang="pl-PL" dirty="0">
-                          <a:solidFill>
-                            <a:schemeClr val="tx1"/>
-                          </a:solidFill>
-                        </a:rPr>
-                        <a:t> </a:t>
-                      </a:r>
-                      <a:r>
-                        <a:rPr lang="pl-PL" dirty="0" err="1">
-                          <a:solidFill>
-                            <a:schemeClr val="tx1"/>
-                          </a:solidFill>
-                        </a:rPr>
-                        <a:t>up</a:t>
-                      </a:r>
-                      <a:r>
-                        <a:rPr lang="pl-PL" dirty="0">
-                          <a:solidFill>
-                            <a:schemeClr val="tx1"/>
-                          </a:solidFill>
-                        </a:rPr>
-                        <a:t> the </a:t>
-                      </a:r>
-                      <a:r>
-                        <a:rPr lang="pl-PL" dirty="0" err="1">
-                          <a:solidFill>
-                            <a:schemeClr val="tx1"/>
-                          </a:solidFill>
-                        </a:rPr>
-                        <a:t>computer</a:t>
-                      </a:r>
-                      <a:r>
-                        <a:rPr lang="pl-PL" dirty="0">
-                          <a:solidFill>
-                            <a:schemeClr val="tx1"/>
-                          </a:solidFill>
-                        </a:rPr>
-                        <a:t> web </a:t>
-                      </a:r>
-                      <a:r>
-                        <a:rPr lang="pl-PL" dirty="0" err="1">
-                          <a:solidFill>
-                            <a:schemeClr val="tx1"/>
-                          </a:solidFill>
-                        </a:rPr>
-                        <a:t>camera</a:t>
-                      </a:r>
-                      <a:r>
-                        <a:rPr lang="pl-PL" dirty="0">
-                          <a:solidFill>
-                            <a:schemeClr val="tx1"/>
-                          </a:solidFill>
-                        </a:rPr>
-                        <a:t> to </a:t>
-                      </a:r>
-                      <a:r>
-                        <a:rPr lang="pl-PL" dirty="0" err="1">
-                          <a:solidFill>
-                            <a:schemeClr val="tx1"/>
-                          </a:solidFill>
-                        </a:rPr>
-                        <a:t>capture</a:t>
-                      </a:r>
-                      <a:r>
-                        <a:rPr lang="pl-PL" dirty="0">
-                          <a:solidFill>
-                            <a:schemeClr val="tx1"/>
-                          </a:solidFill>
-                        </a:rPr>
-                        <a:t> </a:t>
-                      </a:r>
-                      <a:r>
-                        <a:rPr lang="pl-PL" dirty="0" err="1">
-                          <a:solidFill>
-                            <a:schemeClr val="tx1"/>
-                          </a:solidFill>
-                        </a:rPr>
-                        <a:t>frames</a:t>
-                      </a:r>
-                      <a:endParaRPr lang="pl-PL" dirty="0">
-                        <a:solidFill>
-                          <a:schemeClr val="tx1"/>
-                        </a:solidFill>
-                      </a:endParaRPr>
                     </a:p>
                   </a:txBody>
-                  <a:tcPr>
+                  <a:tcPr marL="52341" marR="52341" marT="26170" marB="26170">
                     <a:lnL w="12700" cap="flat" cmpd="sng" algn="ctr">
-                      <a:solidFill>
-                        <a:schemeClr val="tx1"/>
-                      </a:solidFill>
+                      <a:noFill/>
                       <a:prstDash val="solid"/>
                       <a:round/>
                       <a:headEnd type="none" w="med" len="med"/>
                       <a:tailEnd type="none" w="med" len="med"/>
                     </a:lnL>
                     <a:lnR w="12700" cap="flat" cmpd="sng" algn="ctr">
-                      <a:solidFill>
-                        <a:schemeClr val="tx1"/>
-                      </a:solidFill>
+                      <a:noFill/>
                       <a:prstDash val="solid"/>
                       <a:round/>
                       <a:headEnd type="none" w="med" len="med"/>
                       <a:tailEnd type="none" w="med" len="med"/>
                     </a:lnR>
                     <a:lnT w="12700" cap="flat" cmpd="sng" algn="ctr">
-                      <a:solidFill>
-                        <a:schemeClr val="tx1"/>
-                      </a:solidFill>
+                      <a:noFill/>
                       <a:prstDash val="solid"/>
                       <a:round/>
                       <a:headEnd type="none" w="med" len="med"/>
                       <a:tailEnd type="none" w="med" len="med"/>
                     </a:lnT>
                     <a:lnB w="12700" cap="flat" cmpd="sng" algn="ctr">
-                      <a:solidFill>
-                        <a:schemeClr val="tx1"/>
-                      </a:solidFill>
+                      <a:noFill/>
                       <a:prstDash val="solid"/>
                       <a:round/>
                       <a:headEnd type="none" w="med" len="med"/>
@@ -3961,14 +4584,85 @@
                     <a:bodyPr/>
                     <a:lstStyle/>
                     <a:p>
-                      <a:endParaRPr lang="en-GB"/>
+                      <a:pPr marL="0" indent="0" algn="l">
+                        <a:buFont typeface="+mj-lt"/>
+                        <a:buNone/>
+                      </a:pPr>
+                      <a:r>
+                        <a:rPr lang="en-GB" sz="2800" b="1" noProof="0" dirty="0">
+                          <a:solidFill>
+                            <a:schemeClr val="tx1"/>
+                          </a:solidFill>
+                        </a:rPr>
+                        <a:t>Setting up the computer web camera to capture frames</a:t>
+                      </a:r>
                     </a:p>
                   </a:txBody>
-                  <a:tcPr>
+                  <a:tcPr marL="52341" marR="52341" marT="26170" marB="26170">
                     <a:lnL w="12700" cap="flat" cmpd="sng" algn="ctr">
-                      <a:solidFill>
-                        <a:schemeClr val="tx1"/>
-                      </a:solidFill>
+                      <a:noFill/>
+                      <a:prstDash val="solid"/>
+                      <a:round/>
+                      <a:headEnd type="none" w="med" len="med"/>
+                      <a:tailEnd type="none" w="med" len="med"/>
+                    </a:lnL>
+                    <a:lnR w="12700" cap="flat" cmpd="sng" algn="ctr">
+                      <a:noFill/>
+                      <a:prstDash val="solid"/>
+                      <a:round/>
+                      <a:headEnd type="none" w="med" len="med"/>
+                      <a:tailEnd type="none" w="med" len="med"/>
+                    </a:lnR>
+                    <a:lnT w="12700" cap="flat" cmpd="sng" algn="ctr">
+                      <a:noFill/>
+                      <a:prstDash val="solid"/>
+                      <a:round/>
+                      <a:headEnd type="none" w="med" len="med"/>
+                      <a:tailEnd type="none" w="med" len="med"/>
+                    </a:lnT>
+                    <a:lnB w="12700" cap="flat" cmpd="sng" algn="ctr">
+                      <a:noFill/>
+                      <a:prstDash val="solid"/>
+                      <a:round/>
+                      <a:headEnd type="none" w="med" len="med"/>
+                      <a:tailEnd type="none" w="med" len="med"/>
+                    </a:lnB>
+                    <a:lnTlToBr w="12700" cap="flat" cmpd="sng" algn="ctr">
+                      <a:noFill/>
+                      <a:prstDash val="solid"/>
+                      <a:round/>
+                      <a:headEnd type="none" w="med" len="med"/>
+                      <a:tailEnd type="none" w="med" len="med"/>
+                    </a:lnTlToBr>
+                    <a:lnBlToTr w="12700" cap="flat" cmpd="sng" algn="ctr">
+                      <a:noFill/>
+                      <a:prstDash val="solid"/>
+                      <a:round/>
+                      <a:headEnd type="none" w="med" len="med"/>
+                      <a:tailEnd type="none" w="med" len="med"/>
+                    </a:lnBlToTr>
+                    <a:solidFill>
+                      <a:schemeClr val="bg1"/>
+                    </a:solidFill>
+                  </a:tcPr>
+                </a:tc>
+                <a:tc>
+                  <a:txBody>
+                    <a:bodyPr/>
+                    <a:lstStyle/>
+                    <a:p>
+                      <a:endParaRPr lang="en-GB" sz="1600" dirty="0">
+                        <a:solidFill>
+                          <a:schemeClr val="bg2">
+                            <a:lumMod val="25000"/>
+                          </a:schemeClr>
+                        </a:solidFill>
+                      </a:endParaRPr>
+                    </a:p>
+                  </a:txBody>
+                  <a:tcPr marL="52341" marR="52341" marT="26170" marB="26170">
+                    <a:lnL w="12700" cap="flat" cmpd="sng" algn="ctr">
+                      <a:noFill/>
                       <a:prstDash val="solid"/>
                       <a:round/>
                       <a:headEnd type="none" w="med" len="med"/>
@@ -3984,18 +4678,14 @@
                       <a:tailEnd type="none" w="med" len="med"/>
                     </a:lnR>
                     <a:lnT w="12700" cap="flat" cmpd="sng" algn="ctr">
-                      <a:solidFill>
-                        <a:schemeClr val="tx1"/>
-                      </a:solidFill>
+                      <a:noFill/>
                       <a:prstDash val="solid"/>
                       <a:round/>
                       <a:headEnd type="none" w="med" len="med"/>
                       <a:tailEnd type="none" w="med" len="med"/>
                     </a:lnT>
                     <a:lnB w="12700" cap="flat" cmpd="sng" algn="ctr">
-                      <a:solidFill>
-                        <a:schemeClr val="tx1"/>
-                      </a:solidFill>
+                      <a:noFill/>
                       <a:prstDash val="solid"/>
                       <a:round/>
                       <a:headEnd type="none" w="med" len="med"/>
@@ -4020,7 +4710,81 @@
                   </a:ext>
                 </a:extLst>
               </a:tr>
-              <a:tr h="370840">
+              <a:tr h="1010966">
+                <a:tc>
+                  <a:txBody>
+                    <a:bodyPr/>
+                    <a:lstStyle/>
+                    <a:p>
+                      <a:pPr marL="0" marR="0" lvl="0" indent="0" algn="ctr" defTabSz="914400" rtl="0" eaLnBrk="1" fontAlgn="auto" latinLnBrk="0" hangingPunct="1">
+                        <a:lnSpc>
+                          <a:spcPct val="100000"/>
+                        </a:lnSpc>
+                        <a:spcBef>
+                          <a:spcPts val="0"/>
+                        </a:spcBef>
+                        <a:spcAft>
+                          <a:spcPts val="0"/>
+                        </a:spcAft>
+                        <a:buClrTx/>
+                        <a:buSzTx/>
+                        <a:buFont typeface="+mj-lt"/>
+                        <a:buNone/>
+                        <a:tabLst/>
+                        <a:defRPr/>
+                      </a:pPr>
+                      <a:r>
+                        <a:rPr lang="en-GB" sz="4800" b="1" noProof="0" dirty="0">
+                          <a:solidFill>
+                            <a:schemeClr val="accent4"/>
+                          </a:solidFill>
+                        </a:rPr>
+                        <a:t>2</a:t>
+                      </a:r>
+                    </a:p>
+                  </a:txBody>
+                  <a:tcPr marL="52341" marR="52341" marT="26170" marB="26170">
+                    <a:lnL w="12700" cap="flat" cmpd="sng" algn="ctr">
+                      <a:noFill/>
+                      <a:prstDash val="solid"/>
+                      <a:round/>
+                      <a:headEnd type="none" w="med" len="med"/>
+                      <a:tailEnd type="none" w="med" len="med"/>
+                    </a:lnL>
+                    <a:lnR w="12700" cap="flat" cmpd="sng" algn="ctr">
+                      <a:noFill/>
+                      <a:prstDash val="solid"/>
+                      <a:round/>
+                      <a:headEnd type="none" w="med" len="med"/>
+                      <a:tailEnd type="none" w="med" len="med"/>
+                    </a:lnR>
+                    <a:lnT w="12700" cap="flat" cmpd="sng" algn="ctr">
+                      <a:noFill/>
+                      <a:prstDash val="solid"/>
+                      <a:round/>
+                      <a:headEnd type="none" w="med" len="med"/>
+                      <a:tailEnd type="none" w="med" len="med"/>
+                    </a:lnT>
+                    <a:lnB w="12700" cap="flat" cmpd="sng" algn="ctr">
+                      <a:noFill/>
+                      <a:prstDash val="solid"/>
+                      <a:round/>
+                      <a:headEnd type="none" w="med" len="med"/>
+                      <a:tailEnd type="none" w="med" len="med"/>
+                    </a:lnB>
+                    <a:lnTlToBr w="12700" cmpd="sng">
+                      <a:noFill/>
+                      <a:prstDash val="solid"/>
+                    </a:lnTlToBr>
+                    <a:lnBlToTr w="12700" cmpd="sng">
+                      <a:noFill/>
+                      <a:prstDash val="solid"/>
+                    </a:lnBlToTr>
+                    <a:solidFill>
+                      <a:schemeClr val="bg1"/>
+                    </a:solidFill>
+                  </a:tcPr>
+                </a:tc>
                 <a:tc>
                   <a:txBody>
                     <a:bodyPr/>
@@ -4044,104 +4808,57 @@
                         <a:defRPr/>
                       </a:pPr>
                       <a:r>
-                        <a:rPr lang="pl-PL" dirty="0">
+                        <a:rPr lang="en-GB" sz="2800" b="1" noProof="0" dirty="0">
                           <a:solidFill>
                             <a:schemeClr val="tx1"/>
                           </a:solidFill>
                         </a:rPr>
-                        <a:t>2 .  </a:t>
+                        <a:t>Detecting the document contours</a:t>
                       </a:r>
-                      <a:r>
-                        <a:rPr lang="pl-PL" dirty="0" err="1">
-                          <a:solidFill>
-                            <a:schemeClr val="tx1"/>
-                          </a:solidFill>
-                        </a:rPr>
-                        <a:t>Detecting</a:t>
-                      </a:r>
-                      <a:r>
-                        <a:rPr lang="pl-PL" dirty="0">
-                          <a:solidFill>
-                            <a:schemeClr val="tx1"/>
-                          </a:solidFill>
-                        </a:rPr>
-                        <a:t> the </a:t>
-                      </a:r>
-                      <a:r>
-                        <a:rPr lang="pl-PL" dirty="0" err="1">
-                          <a:solidFill>
-                            <a:schemeClr val="tx1"/>
-                          </a:solidFill>
-                        </a:rPr>
-                        <a:t>document</a:t>
-                      </a:r>
-                      <a:r>
-                        <a:rPr lang="pl-PL" dirty="0">
-                          <a:solidFill>
-                            <a:schemeClr val="tx1"/>
-                          </a:solidFill>
-                        </a:rPr>
-                        <a:t> </a:t>
-                      </a:r>
-                      <a:r>
-                        <a:rPr lang="pl-PL" dirty="0" err="1">
-                          <a:solidFill>
-                            <a:schemeClr val="tx1"/>
-                          </a:solidFill>
-                        </a:rPr>
-                        <a:t>contours</a:t>
-                      </a:r>
-                      <a:endParaRPr lang="pl-PL" dirty="0">
-                        <a:solidFill>
-                          <a:schemeClr val="tx1"/>
-                        </a:solidFill>
-                      </a:endParaRPr>
                     </a:p>
                   </a:txBody>
-                  <a:tcPr>
+                  <a:tcPr marL="52341" marR="52341" marT="26170" marB="26170">
                     <a:lnL w="12700" cap="flat" cmpd="sng" algn="ctr">
-                      <a:solidFill>
-                        <a:schemeClr val="tx1"/>
-                      </a:solidFill>
+                      <a:noFill/>
                       <a:prstDash val="solid"/>
                       <a:round/>
                       <a:headEnd type="none" w="med" len="med"/>
                       <a:tailEnd type="none" w="med" len="med"/>
                     </a:lnL>
                     <a:lnR w="12700" cap="flat" cmpd="sng" algn="ctr">
-                      <a:solidFill>
-                        <a:schemeClr val="tx1"/>
-                      </a:solidFill>
+                      <a:noFill/>
                       <a:prstDash val="solid"/>
                       <a:round/>
                       <a:headEnd type="none" w="med" len="med"/>
                       <a:tailEnd type="none" w="med" len="med"/>
                     </a:lnR>
                     <a:lnT w="12700" cap="flat" cmpd="sng" algn="ctr">
-                      <a:solidFill>
-                        <a:schemeClr val="tx1"/>
-                      </a:solidFill>
+                      <a:noFill/>
                       <a:prstDash val="solid"/>
                       <a:round/>
                       <a:headEnd type="none" w="med" len="med"/>
                       <a:tailEnd type="none" w="med" len="med"/>
                     </a:lnT>
                     <a:lnB w="12700" cap="flat" cmpd="sng" algn="ctr">
-                      <a:solidFill>
-                        <a:schemeClr val="tx1"/>
-                      </a:solidFill>
+                      <a:noFill/>
                       <a:prstDash val="solid"/>
                       <a:round/>
                       <a:headEnd type="none" w="med" len="med"/>
                       <a:tailEnd type="none" w="med" len="med"/>
                     </a:lnB>
-                    <a:lnTlToBr w="12700" cmpd="sng">
+                    <a:lnTlToBr w="12700" cap="flat" cmpd="sng" algn="ctr">
                       <a:noFill/>
                       <a:prstDash val="solid"/>
+                      <a:round/>
+                      <a:headEnd type="none" w="med" len="med"/>
+                      <a:tailEnd type="none" w="med" len="med"/>
                     </a:lnTlToBr>
-                    <a:lnBlToTr w="12700" cmpd="sng">
+                    <a:lnBlToTr w="12700" cap="flat" cmpd="sng" algn="ctr">
                       <a:noFill/>
                       <a:prstDash val="solid"/>
+                      <a:round/>
+                      <a:headEnd type="none" w="med" len="med"/>
+                      <a:tailEnd type="none" w="med" len="med"/>
                     </a:lnBlToTr>
                     <a:solidFill>
                       <a:schemeClr val="bg1"/>
@@ -4153,14 +4870,165 @@
                     <a:bodyPr/>
                     <a:lstStyle/>
                     <a:p>
-                      <a:endParaRPr lang="en-GB" dirty="0"/>
+                      <a:pPr marL="342900" indent="-342900">
+                        <a:buFont typeface="+mj-lt"/>
+                        <a:buAutoNum type="arabicPeriod"/>
+                      </a:pPr>
+                      <a:r>
+                        <a:rPr lang="en-GB" sz="1600" noProof="0" dirty="0">
+                          <a:solidFill>
+                            <a:schemeClr val="bg2">
+                              <a:lumMod val="25000"/>
+                            </a:schemeClr>
+                          </a:solidFill>
+                        </a:rPr>
+                        <a:t>Blurring the image with gaussian blur</a:t>
+                      </a:r>
+                    </a:p>
+                    <a:p>
+                      <a:pPr marL="342900" indent="-342900">
+                        <a:buFont typeface="+mj-lt"/>
+                        <a:buAutoNum type="arabicPeriod"/>
+                      </a:pPr>
+                      <a:r>
+                        <a:rPr lang="en-GB" sz="1600" noProof="0" dirty="0">
+                          <a:solidFill>
+                            <a:schemeClr val="bg2">
+                              <a:lumMod val="25000"/>
+                            </a:schemeClr>
+                          </a:solidFill>
+                        </a:rPr>
+                        <a:t>Detecting the edges with canny Edge detector</a:t>
+                      </a:r>
+                    </a:p>
+                    <a:p>
+                      <a:pPr marL="342900" marR="0" lvl="0" indent="-342900" algn="l" defTabSz="914400" rtl="0" eaLnBrk="1" fontAlgn="auto" latinLnBrk="0" hangingPunct="1">
+                        <a:lnSpc>
+                          <a:spcPct val="100000"/>
+                        </a:lnSpc>
+                        <a:spcBef>
+                          <a:spcPts val="0"/>
+                        </a:spcBef>
+                        <a:spcAft>
+                          <a:spcPts val="0"/>
+                        </a:spcAft>
+                        <a:buClrTx/>
+                        <a:buSzTx/>
+                        <a:buFont typeface="+mj-lt"/>
+                        <a:buAutoNum type="arabicPeriod"/>
+                        <a:tabLst/>
+                        <a:defRPr/>
+                      </a:pPr>
+                      <a:r>
+                        <a:rPr lang="en-GB" sz="1600" noProof="0" dirty="0">
+                          <a:solidFill>
+                            <a:schemeClr val="bg2">
+                              <a:lumMod val="25000"/>
+                            </a:schemeClr>
+                          </a:solidFill>
+                        </a:rPr>
+                        <a:t>Finding</a:t>
+                      </a:r>
+                      <a:r>
+                        <a:rPr lang="pl-PL" sz="1600" dirty="0">
+                          <a:solidFill>
+                            <a:schemeClr val="bg2">
+                              <a:lumMod val="25000"/>
+                            </a:schemeClr>
+                          </a:solidFill>
+                        </a:rPr>
+                        <a:t> </a:t>
+                      </a:r>
+                      <a:r>
+                        <a:rPr lang="en-GB" sz="1600" noProof="0" dirty="0">
+                          <a:solidFill>
+                            <a:schemeClr val="bg2">
+                              <a:lumMod val="25000"/>
+                            </a:schemeClr>
+                          </a:solidFill>
+                        </a:rPr>
+                        <a:t>contours on the edges image with </a:t>
+                      </a:r>
+                      <a:r>
+                        <a:rPr lang="en-GB" sz="1600" kern="1200" dirty="0" err="1">
+                          <a:solidFill>
+                            <a:schemeClr val="bg2">
+                              <a:lumMod val="25000"/>
+                            </a:schemeClr>
+                          </a:solidFill>
+                          <a:effectLst/>
+                          <a:latin typeface="+mn-lt"/>
+                          <a:ea typeface="+mn-ea"/>
+                          <a:cs typeface="+mn-cs"/>
+                        </a:rPr>
+                        <a:t>findContours</a:t>
+                      </a:r>
+                      <a:r>
+                        <a:rPr lang="pl-PL" sz="1600" kern="1200" dirty="0">
+                          <a:solidFill>
+                            <a:schemeClr val="bg2">
+                              <a:lumMod val="25000"/>
+                            </a:schemeClr>
+                          </a:solidFill>
+                          <a:effectLst/>
+                          <a:latin typeface="+mn-lt"/>
+                          <a:ea typeface="+mn-ea"/>
+                          <a:cs typeface="+mn-cs"/>
+                        </a:rPr>
+                        <a:t> </a:t>
+                      </a:r>
+                      <a:r>
+                        <a:rPr lang="en-GB" sz="1600" kern="1200" noProof="0" dirty="0">
+                          <a:solidFill>
+                            <a:schemeClr val="bg2">
+                              <a:lumMod val="25000"/>
+                            </a:schemeClr>
+                          </a:solidFill>
+                          <a:effectLst/>
+                          <a:latin typeface="+mn-lt"/>
+                          <a:ea typeface="+mn-ea"/>
+                          <a:cs typeface="+mn-cs"/>
+                        </a:rPr>
+                        <a:t>function</a:t>
+                      </a:r>
+                    </a:p>
+                    <a:p>
+                      <a:pPr marL="342900" marR="0" lvl="0" indent="-342900" algn="l" defTabSz="914400" rtl="0" eaLnBrk="1" fontAlgn="auto" latinLnBrk="0" hangingPunct="1">
+                        <a:lnSpc>
+                          <a:spcPct val="100000"/>
+                        </a:lnSpc>
+                        <a:spcBef>
+                          <a:spcPts val="0"/>
+                        </a:spcBef>
+                        <a:spcAft>
+                          <a:spcPts val="0"/>
+                        </a:spcAft>
+                        <a:buClrTx/>
+                        <a:buSzTx/>
+                        <a:buFont typeface="+mj-lt"/>
+                        <a:buAutoNum type="arabicPeriod"/>
+                        <a:tabLst/>
+                        <a:defRPr/>
+                      </a:pPr>
+                      <a:r>
+                        <a:rPr lang="en-GB" sz="1600" kern="1200" noProof="0" dirty="0">
+                          <a:solidFill>
+                            <a:schemeClr val="bg2">
+                              <a:lumMod val="25000"/>
+                            </a:schemeClr>
+                          </a:solidFill>
+                          <a:effectLst/>
+                          <a:latin typeface="+mn-lt"/>
+                          <a:ea typeface="+mn-ea"/>
+                          <a:cs typeface="+mn-cs"/>
+                        </a:rPr>
+                        <a:t>Finding the biggest contour with 4 vertexes</a:t>
+                      </a:r>
                     </a:p>
                   </a:txBody>
-                  <a:tcPr>
+                  <a:tcPr marL="52341" marR="52341" marT="26170" marB="26170">
                     <a:lnL w="12700" cap="flat" cmpd="sng" algn="ctr">
-                      <a:solidFill>
-                        <a:schemeClr val="tx1"/>
-                      </a:solidFill>
+                      <a:noFill/>
                       <a:prstDash val="solid"/>
                       <a:round/>
                       <a:headEnd type="none" w="med" len="med"/>
@@ -4176,18 +5044,14 @@
                       <a:tailEnd type="none" w="med" len="med"/>
                     </a:lnR>
                     <a:lnT w="12700" cap="flat" cmpd="sng" algn="ctr">
-                      <a:solidFill>
-                        <a:schemeClr val="tx1"/>
-                      </a:solidFill>
+                      <a:noFill/>
                       <a:prstDash val="solid"/>
                       <a:round/>
                       <a:headEnd type="none" w="med" len="med"/>
                       <a:tailEnd type="none" w="med" len="med"/>
                     </a:lnT>
                     <a:lnB w="12700" cap="flat" cmpd="sng" algn="ctr">
-                      <a:solidFill>
-                        <a:schemeClr val="tx1"/>
-                      </a:solidFill>
+                      <a:noFill/>
                       <a:prstDash val="solid"/>
                       <a:round/>
                       <a:headEnd type="none" w="med" len="med"/>
@@ -4212,7 +5076,81 @@
                   </a:ext>
                 </a:extLst>
               </a:tr>
-              <a:tr h="370840">
+              <a:tr h="1333911">
+                <a:tc>
+                  <a:txBody>
+                    <a:bodyPr/>
+                    <a:lstStyle/>
+                    <a:p>
+                      <a:pPr marL="0" marR="0" lvl="0" indent="0" algn="ctr" defTabSz="914400" rtl="0" eaLnBrk="1" fontAlgn="auto" latinLnBrk="0" hangingPunct="1">
+                        <a:lnSpc>
+                          <a:spcPct val="100000"/>
+                        </a:lnSpc>
+                        <a:spcBef>
+                          <a:spcPts val="0"/>
+                        </a:spcBef>
+                        <a:spcAft>
+                          <a:spcPts val="0"/>
+                        </a:spcAft>
+                        <a:buClrTx/>
+                        <a:buSzTx/>
+                        <a:buFontTx/>
+                        <a:buNone/>
+                        <a:tabLst/>
+                        <a:defRPr/>
+                      </a:pPr>
+                      <a:r>
+                        <a:rPr lang="en-GB" sz="4800" b="1" noProof="0" dirty="0">
+                          <a:solidFill>
+                            <a:schemeClr val="accent4"/>
+                          </a:solidFill>
+                        </a:rPr>
+                        <a:t>3</a:t>
+                      </a:r>
+                    </a:p>
+                  </a:txBody>
+                  <a:tcPr marL="52341" marR="52341" marT="26170" marB="26170">
+                    <a:lnL w="12700" cap="flat" cmpd="sng" algn="ctr">
+                      <a:noFill/>
+                      <a:prstDash val="solid"/>
+                      <a:round/>
+                      <a:headEnd type="none" w="med" len="med"/>
+                      <a:tailEnd type="none" w="med" len="med"/>
+                    </a:lnL>
+                    <a:lnR w="12700" cap="flat" cmpd="sng" algn="ctr">
+                      <a:noFill/>
+                      <a:prstDash val="solid"/>
+                      <a:round/>
+                      <a:headEnd type="none" w="med" len="med"/>
+                      <a:tailEnd type="none" w="med" len="med"/>
+                    </a:lnR>
+                    <a:lnT w="12700" cap="flat" cmpd="sng" algn="ctr">
+                      <a:noFill/>
+                      <a:prstDash val="solid"/>
+                      <a:round/>
+                      <a:headEnd type="none" w="med" len="med"/>
+                      <a:tailEnd type="none" w="med" len="med"/>
+                    </a:lnT>
+                    <a:lnB w="12700" cap="flat" cmpd="sng" algn="ctr">
+                      <a:noFill/>
+                      <a:prstDash val="solid"/>
+                      <a:round/>
+                      <a:headEnd type="none" w="med" len="med"/>
+                      <a:tailEnd type="none" w="med" len="med"/>
+                    </a:lnB>
+                    <a:lnTlToBr w="12700" cmpd="sng">
+                      <a:noFill/>
+                      <a:prstDash val="solid"/>
+                    </a:lnTlToBr>
+                    <a:lnBlToTr w="12700" cmpd="sng">
+                      <a:noFill/>
+                      <a:prstDash val="solid"/>
+                    </a:lnBlToTr>
+                    <a:solidFill>
+                      <a:schemeClr val="bg1"/>
+                    </a:solidFill>
+                  </a:tcPr>
+                </a:tc>
                 <a:tc>
                   <a:txBody>
                     <a:bodyPr/>
@@ -4236,132 +5174,58 @@
                         <a:defRPr/>
                       </a:pPr>
                       <a:r>
-                        <a:rPr lang="pl-PL" dirty="0">
+                        <a:rPr lang="en-GB" sz="2800" b="1" noProof="0" dirty="0">
                           <a:solidFill>
                             <a:schemeClr val="tx1"/>
                           </a:solidFill>
                         </a:rPr>
-                        <a:t>3 .  </a:t>
+                        <a:t>cropping the image and transforming it into rectangle</a:t>
                       </a:r>
-                      <a:r>
-                        <a:rPr lang="pl-PL" dirty="0" err="1">
-                          <a:solidFill>
-                            <a:schemeClr val="tx1"/>
-                          </a:solidFill>
-                        </a:rPr>
-                        <a:t>cropping</a:t>
-                      </a:r>
-                      <a:r>
-                        <a:rPr lang="pl-PL" dirty="0">
-                          <a:solidFill>
-                            <a:schemeClr val="tx1"/>
-                          </a:solidFill>
-                        </a:rPr>
-                        <a:t> the image and </a:t>
-                      </a:r>
-                      <a:r>
-                        <a:rPr lang="pl-PL" dirty="0" err="1">
-                          <a:solidFill>
-                            <a:schemeClr val="tx1"/>
-                          </a:solidFill>
-                        </a:rPr>
-                        <a:t>transforming</a:t>
-                      </a:r>
-                      <a:r>
-                        <a:rPr lang="pl-PL" dirty="0">
-                          <a:solidFill>
-                            <a:schemeClr val="tx1"/>
-                          </a:solidFill>
-                        </a:rPr>
-                        <a:t> </a:t>
-                      </a:r>
-                      <a:r>
-                        <a:rPr lang="pl-PL" dirty="0" err="1">
-                          <a:solidFill>
-                            <a:schemeClr val="tx1"/>
-                          </a:solidFill>
-                        </a:rPr>
-                        <a:t>it</a:t>
-                      </a:r>
-                      <a:r>
-                        <a:rPr lang="pl-PL" dirty="0">
-                          <a:solidFill>
-                            <a:schemeClr val="tx1"/>
-                          </a:solidFill>
-                        </a:rPr>
-                        <a:t> </a:t>
-                      </a:r>
-                      <a:r>
-                        <a:rPr lang="pl-PL" dirty="0" err="1">
-                          <a:solidFill>
-                            <a:schemeClr val="tx1"/>
-                          </a:solidFill>
-                        </a:rPr>
-                        <a:t>into</a:t>
-                      </a:r>
-                      <a:r>
-                        <a:rPr lang="pl-PL" dirty="0">
-                          <a:solidFill>
-                            <a:schemeClr val="tx1"/>
-                          </a:solidFill>
-                        </a:rPr>
-                        <a:t> </a:t>
-                      </a:r>
-                      <a:r>
-                        <a:rPr lang="pl-PL" dirty="0" err="1">
-                          <a:solidFill>
-                            <a:schemeClr val="tx1"/>
-                          </a:solidFill>
-                        </a:rPr>
-                        <a:t>rectangle</a:t>
-                      </a:r>
-                      <a:endParaRPr lang="en-GB" dirty="0"/>
+                      <a:endParaRPr lang="en-GB" sz="2800" b="1" noProof="0" dirty="0"/>
                     </a:p>
                   </a:txBody>
-                  <a:tcPr>
+                  <a:tcPr marL="52341" marR="52341" marT="26170" marB="26170">
                     <a:lnL w="12700" cap="flat" cmpd="sng" algn="ctr">
-                      <a:solidFill>
-                        <a:schemeClr val="tx1"/>
-                      </a:solidFill>
+                      <a:noFill/>
                       <a:prstDash val="solid"/>
                       <a:round/>
                       <a:headEnd type="none" w="med" len="med"/>
                       <a:tailEnd type="none" w="med" len="med"/>
                     </a:lnL>
                     <a:lnR w="12700" cap="flat" cmpd="sng" algn="ctr">
-                      <a:solidFill>
-                        <a:schemeClr val="tx1"/>
-                      </a:solidFill>
+                      <a:noFill/>
                       <a:prstDash val="solid"/>
                       <a:round/>
                       <a:headEnd type="none" w="med" len="med"/>
                       <a:tailEnd type="none" w="med" len="med"/>
                     </a:lnR>
                     <a:lnT w="12700" cap="flat" cmpd="sng" algn="ctr">
-                      <a:solidFill>
-                        <a:schemeClr val="tx1"/>
-                      </a:solidFill>
+                      <a:noFill/>
                       <a:prstDash val="solid"/>
                       <a:round/>
                       <a:headEnd type="none" w="med" len="med"/>
                       <a:tailEnd type="none" w="med" len="med"/>
                     </a:lnT>
                     <a:lnB w="12700" cap="flat" cmpd="sng" algn="ctr">
-                      <a:solidFill>
-                        <a:schemeClr val="tx1"/>
-                      </a:solidFill>
+                      <a:noFill/>
                       <a:prstDash val="solid"/>
                       <a:round/>
                       <a:headEnd type="none" w="med" len="med"/>
                       <a:tailEnd type="none" w="med" len="med"/>
                     </a:lnB>
-                    <a:lnTlToBr w="12700" cmpd="sng">
+                    <a:lnTlToBr w="12700" cap="flat" cmpd="sng" algn="ctr">
                       <a:noFill/>
                       <a:prstDash val="solid"/>
+                      <a:round/>
+                      <a:headEnd type="none" w="med" len="med"/>
+                      <a:tailEnd type="none" w="med" len="med"/>
                     </a:lnTlToBr>
-                    <a:lnBlToTr w="12700" cmpd="sng">
+                    <a:lnBlToTr w="12700" cap="flat" cmpd="sng" algn="ctr">
                       <a:noFill/>
                       <a:prstDash val="solid"/>
+                      <a:round/>
+                      <a:headEnd type="none" w="med" len="med"/>
+                      <a:tailEnd type="none" w="med" len="med"/>
                     </a:lnBlToTr>
                     <a:solidFill>
                       <a:schemeClr val="bg1"/>
@@ -4373,14 +5237,110 @@
                     <a:bodyPr/>
                     <a:lstStyle/>
                     <a:p>
-                      <a:endParaRPr lang="en-GB" dirty="0"/>
+                      <a:pPr marL="342900" indent="-342900">
+                        <a:buFont typeface="+mj-lt"/>
+                        <a:buAutoNum type="arabicPeriod"/>
+                      </a:pPr>
+                      <a:r>
+                        <a:rPr lang="en-GB" sz="1600" dirty="0">
+                          <a:solidFill>
+                            <a:schemeClr val="bg2">
+                              <a:lumMod val="25000"/>
+                            </a:schemeClr>
+                          </a:solidFill>
+                        </a:rPr>
+                        <a:t>Orde</a:t>
+                      </a:r>
+                      <a:r>
+                        <a:rPr lang="pl-PL" sz="1600" dirty="0">
+                          <a:solidFill>
+                            <a:schemeClr val="bg2">
+                              <a:lumMod val="25000"/>
+                            </a:schemeClr>
+                          </a:solidFill>
+                        </a:rPr>
+                        <a:t>ring the </a:t>
+                      </a:r>
+                      <a:r>
+                        <a:rPr lang="en-GB" sz="1600" noProof="0" dirty="0">
+                          <a:solidFill>
+                            <a:schemeClr val="bg2">
+                              <a:lumMod val="25000"/>
+                            </a:schemeClr>
+                          </a:solidFill>
+                        </a:rPr>
+                        <a:t>contour</a:t>
+                      </a:r>
+                      <a:r>
+                        <a:rPr lang="pl-PL" sz="1600" dirty="0">
+                          <a:solidFill>
+                            <a:schemeClr val="bg2">
+                              <a:lumMod val="25000"/>
+                            </a:schemeClr>
+                          </a:solidFill>
+                        </a:rPr>
+                        <a:t> </a:t>
+                      </a:r>
+                      <a:r>
+                        <a:rPr lang="en-GB" sz="1600" noProof="0" dirty="0">
+                          <a:solidFill>
+                            <a:schemeClr val="bg2">
+                              <a:lumMod val="25000"/>
+                            </a:schemeClr>
+                          </a:solidFill>
+                        </a:rPr>
+                        <a:t>vertexes</a:t>
+                      </a:r>
+                    </a:p>
+                    <a:p>
+                      <a:pPr marL="342900" indent="-342900">
+                        <a:buFont typeface="+mj-lt"/>
+                        <a:buAutoNum type="arabicPeriod"/>
+                      </a:pPr>
+                      <a:r>
+                        <a:rPr lang="en-GB" sz="1600" noProof="0" dirty="0">
+                          <a:solidFill>
+                            <a:schemeClr val="bg2">
+                              <a:lumMod val="25000"/>
+                            </a:schemeClr>
+                          </a:solidFill>
+                        </a:rPr>
+                        <a:t>Computing the size of the output image</a:t>
+                      </a:r>
+                    </a:p>
+                    <a:p>
+                      <a:pPr marL="342900" indent="-342900">
+                        <a:buFont typeface="+mj-lt"/>
+                        <a:buAutoNum type="arabicPeriod"/>
+                      </a:pPr>
+                      <a:r>
+                        <a:rPr lang="en-GB" sz="1600" noProof="0" dirty="0">
+                          <a:solidFill>
+                            <a:schemeClr val="bg2">
+                              <a:lumMod val="25000"/>
+                            </a:schemeClr>
+                          </a:solidFill>
+                        </a:rPr>
+                        <a:t>Computing the transformation matrix with open CV</a:t>
+                      </a:r>
+                    </a:p>
+                    <a:p>
+                      <a:pPr marL="342900" indent="-342900">
+                        <a:buFont typeface="+mj-lt"/>
+                        <a:buAutoNum type="arabicPeriod"/>
+                      </a:pPr>
+                      <a:endParaRPr lang="pl-PL" sz="1600" dirty="0">
+                        <a:solidFill>
+                          <a:schemeClr val="bg2">
+                            <a:lumMod val="25000"/>
+                          </a:schemeClr>
+                        </a:solidFill>
+                      </a:endParaRPr>
                     </a:p>
                   </a:txBody>
-                  <a:tcPr>
+                  <a:tcPr marL="52341" marR="52341" marT="26170" marB="26170">
                     <a:lnL w="12700" cap="flat" cmpd="sng" algn="ctr">
-                      <a:solidFill>
-                        <a:schemeClr val="tx1"/>
-                      </a:solidFill>
+                      <a:noFill/>
                       <a:prstDash val="solid"/>
                       <a:round/>
                       <a:headEnd type="none" w="med" len="med"/>
@@ -4396,18 +5356,14 @@
                       <a:tailEnd type="none" w="med" len="med"/>
                     </a:lnR>
                     <a:lnT w="12700" cap="flat" cmpd="sng" algn="ctr">
-                      <a:solidFill>
-                        <a:schemeClr val="tx1"/>
-                      </a:solidFill>
+                      <a:noFill/>
                       <a:prstDash val="solid"/>
                       <a:round/>
                       <a:headEnd type="none" w="med" len="med"/>
                       <a:tailEnd type="none" w="med" len="med"/>
                     </a:lnT>
                     <a:lnB w="12700" cap="flat" cmpd="sng" algn="ctr">
-                      <a:solidFill>
-                        <a:schemeClr val="tx1"/>
-                      </a:solidFill>
+                      <a:noFill/>
                       <a:prstDash val="solid"/>
                       <a:round/>
                       <a:headEnd type="none" w="med" len="med"/>
@@ -4432,7 +5388,65 @@
                   </a:ext>
                 </a:extLst>
               </a:tr>
-              <a:tr h="370840">
+              <a:tr h="795295">
+                <a:tc>
+                  <a:txBody>
+                    <a:bodyPr/>
+                    <a:lstStyle/>
+                    <a:p>
+                      <a:pPr algn="ctr"/>
+                      <a:r>
+                        <a:rPr lang="en-GB" sz="4800" b="1" noProof="0" dirty="0">
+                          <a:solidFill>
+                            <a:schemeClr val="accent4"/>
+                          </a:solidFill>
+                        </a:rPr>
+                        <a:t>4</a:t>
+                      </a:r>
+                    </a:p>
+                  </a:txBody>
+                  <a:tcPr marL="52341" marR="52341" marT="26170" marB="26170">
+                    <a:lnL w="12700" cap="flat" cmpd="sng" algn="ctr">
+                      <a:noFill/>
+                      <a:prstDash val="solid"/>
+                      <a:round/>
+                      <a:headEnd type="none" w="med" len="med"/>
+                      <a:tailEnd type="none" w="med" len="med"/>
+                    </a:lnL>
+                    <a:lnR w="12700" cap="flat" cmpd="sng" algn="ctr">
+                      <a:noFill/>
+                      <a:prstDash val="solid"/>
+                      <a:round/>
+                      <a:headEnd type="none" w="med" len="med"/>
+                      <a:tailEnd type="none" w="med" len="med"/>
+                    </a:lnR>
+                    <a:lnT w="12700" cap="flat" cmpd="sng" algn="ctr">
+                      <a:noFill/>
+                      <a:prstDash val="solid"/>
+                      <a:round/>
+                      <a:headEnd type="none" w="med" len="med"/>
+                      <a:tailEnd type="none" w="med" len="med"/>
+                    </a:lnT>
+                    <a:lnB w="12700" cap="flat" cmpd="sng" algn="ctr">
+                      <a:noFill/>
+                      <a:prstDash val="solid"/>
+                      <a:round/>
+                      <a:headEnd type="none" w="med" len="med"/>
+                      <a:tailEnd type="none" w="med" len="med"/>
+                    </a:lnB>
+                    <a:lnTlToBr w="12700" cmpd="sng">
+                      <a:noFill/>
+                      <a:prstDash val="solid"/>
+                    </a:lnTlToBr>
+                    <a:lnBlToTr w="12700" cmpd="sng">
+                      <a:noFill/>
+                      <a:prstDash val="solid"/>
+                    </a:lnBlToTr>
+                    <a:solidFill>
+                      <a:schemeClr val="bg1"/>
+                    </a:solidFill>
+                  </a:tcPr>
+                </a:tc>
                 <a:tc>
                   <a:txBody>
                     <a:bodyPr/>
@@ -4456,83 +5470,57 @@
                         <a:defRPr/>
                       </a:pPr>
                       <a:r>
-                        <a:rPr lang="pl-PL" dirty="0">
+                        <a:rPr lang="en-GB" sz="2800" b="1" noProof="0" dirty="0">
                           <a:solidFill>
                             <a:schemeClr val="tx1"/>
                           </a:solidFill>
                         </a:rPr>
-                        <a:t>4 .  </a:t>
+                        <a:t>Binarization of the image</a:t>
                       </a:r>
-                      <a:r>
-                        <a:rPr lang="pl-PL" dirty="0" err="1">
-                          <a:solidFill>
-                            <a:schemeClr val="tx1"/>
-                          </a:solidFill>
-                        </a:rPr>
-                        <a:t>Binarization</a:t>
-                      </a:r>
-                      <a:r>
-                        <a:rPr lang="pl-PL">
-                          <a:solidFill>
-                            <a:schemeClr val="tx1"/>
-                          </a:solidFill>
-                        </a:rPr>
-                        <a:t> of the image</a:t>
-                      </a:r>
-                      <a:endParaRPr lang="pl-PL" dirty="0">
-                        <a:solidFill>
-                          <a:schemeClr val="tx1"/>
-                        </a:solidFill>
-                      </a:endParaRPr>
-                    </a:p>
-                    <a:p>
-                      <a:endParaRPr lang="en-GB" dirty="0"/>
                     </a:p>
                   </a:txBody>
-                  <a:tcPr>
+                  <a:tcPr marL="52341" marR="52341" marT="26170" marB="26170">
                     <a:lnL w="12700" cap="flat" cmpd="sng" algn="ctr">
-                      <a:solidFill>
-                        <a:schemeClr val="tx1"/>
-                      </a:solidFill>
+                      <a:noFill/>
                       <a:prstDash val="solid"/>
                       <a:round/>
                       <a:headEnd type="none" w="med" len="med"/>
                       <a:tailEnd type="none" w="med" len="med"/>
                     </a:lnL>
                     <a:lnR w="12700" cap="flat" cmpd="sng" algn="ctr">
-                      <a:solidFill>
-                        <a:schemeClr val="tx1"/>
-                      </a:solidFill>
+                      <a:noFill/>
                       <a:prstDash val="solid"/>
                       <a:round/>
                       <a:headEnd type="none" w="med" len="med"/>
                       <a:tailEnd type="none" w="med" len="med"/>
                     </a:lnR>
                     <a:lnT w="12700" cap="flat" cmpd="sng" algn="ctr">
-                      <a:solidFill>
-                        <a:schemeClr val="tx1"/>
-                      </a:solidFill>
+                      <a:noFill/>
                       <a:prstDash val="solid"/>
                       <a:round/>
                       <a:headEnd type="none" w="med" len="med"/>
                       <a:tailEnd type="none" w="med" len="med"/>
                     </a:lnT>
                     <a:lnB w="12700" cap="flat" cmpd="sng" algn="ctr">
-                      <a:solidFill>
-                        <a:schemeClr val="tx1"/>
-                      </a:solidFill>
+                      <a:noFill/>
                       <a:prstDash val="solid"/>
                       <a:round/>
                       <a:headEnd type="none" w="med" len="med"/>
                       <a:tailEnd type="none" w="med" len="med"/>
                     </a:lnB>
-                    <a:lnTlToBr w="12700" cmpd="sng">
+                    <a:lnTlToBr w="12700" cap="flat" cmpd="sng" algn="ctr">
                       <a:noFill/>
                       <a:prstDash val="solid"/>
+                      <a:round/>
+                      <a:headEnd type="none" w="med" len="med"/>
+                      <a:tailEnd type="none" w="med" len="med"/>
                     </a:lnTlToBr>
-                    <a:lnBlToTr w="12700" cmpd="sng">
+                    <a:lnBlToTr w="12700" cap="flat" cmpd="sng" algn="ctr">
                       <a:noFill/>
                       <a:prstDash val="solid"/>
+                      <a:round/>
+                      <a:headEnd type="none" w="med" len="med"/>
+                      <a:tailEnd type="none" w="med" len="med"/>
                     </a:lnBlToTr>
                     <a:solidFill>
                       <a:schemeClr val="bg1"/>
@@ -4544,14 +5532,18 @@
                     <a:bodyPr/>
                     <a:lstStyle/>
                     <a:p>
-                      <a:endParaRPr lang="en-GB"/>
+                      <a:endParaRPr lang="en-GB" sz="1600" dirty="0">
+                        <a:solidFill>
+                          <a:schemeClr val="bg2">
+                            <a:lumMod val="25000"/>
+                          </a:schemeClr>
+                        </a:solidFill>
+                      </a:endParaRPr>
                     </a:p>
                   </a:txBody>
-                  <a:tcPr>
+                  <a:tcPr marL="52341" marR="52341" marT="26170" marB="26170">
                     <a:lnL w="12700" cap="flat" cmpd="sng" algn="ctr">
-                      <a:solidFill>
-                        <a:schemeClr val="tx1"/>
-                      </a:solidFill>
+                      <a:noFill/>
                       <a:prstDash val="solid"/>
                       <a:round/>
                       <a:headEnd type="none" w="med" len="med"/>
@@ -4567,18 +5559,14 @@
                       <a:tailEnd type="none" w="med" len="med"/>
                     </a:lnR>
                     <a:lnT w="12700" cap="flat" cmpd="sng" algn="ctr">
-                      <a:solidFill>
-                        <a:schemeClr val="tx1"/>
-                      </a:solidFill>
+                      <a:noFill/>
                       <a:prstDash val="solid"/>
                       <a:round/>
                       <a:headEnd type="none" w="med" len="med"/>
                       <a:tailEnd type="none" w="med" len="med"/>
                     </a:lnT>
                     <a:lnB w="12700" cap="flat" cmpd="sng" algn="ctr">
-                      <a:solidFill>
-                        <a:schemeClr val="tx1"/>
-                      </a:solidFill>
+                      <a:noFill/>
                       <a:prstDash val="solid"/>
                       <a:round/>
                       <a:headEnd type="none" w="med" len="med"/>
@@ -4600,269 +5588,6 @@
                 <a:extLst>
                   <a:ext uri="{0D108BD9-81ED-4DB2-BD59-A6C34878D82A}">
                     <a16:rowId xmlns:a16="http://schemas.microsoft.com/office/drawing/2014/main" val="3256169225"/>
-                  </a:ext>
-                </a:extLst>
-              </a:tr>
-              <a:tr h="370840">
-                <a:tc>
-                  <a:txBody>
-                    <a:bodyPr/>
-                    <a:lstStyle/>
-                    <a:p>
-                      <a:pPr marL="0" marR="0" lvl="0" indent="0" algn="l" defTabSz="914400" rtl="0" eaLnBrk="1" fontAlgn="auto" latinLnBrk="0" hangingPunct="1">
-                        <a:lnSpc>
-                          <a:spcPct val="100000"/>
-                        </a:lnSpc>
-                        <a:spcBef>
-                          <a:spcPts val="0"/>
-                        </a:spcBef>
-                        <a:spcAft>
-                          <a:spcPts val="0"/>
-                        </a:spcAft>
-                        <a:buClrTx/>
-                        <a:buSzTx/>
-                        <a:buFontTx/>
-                        <a:buNone/>
-                        <a:tabLst/>
-                        <a:defRPr/>
-                      </a:pPr>
-                      <a:endParaRPr lang="en-GB" dirty="0"/>
-                    </a:p>
-                  </a:txBody>
-                  <a:tcPr>
-                    <a:lnL w="12700" cap="flat" cmpd="sng" algn="ctr">
-                      <a:solidFill>
-                        <a:schemeClr val="tx1"/>
-                      </a:solidFill>
-                      <a:prstDash val="solid"/>
-                      <a:round/>
-                      <a:headEnd type="none" w="med" len="med"/>
-                      <a:tailEnd type="none" w="med" len="med"/>
-                    </a:lnL>
-                    <a:lnR w="12700" cap="flat" cmpd="sng" algn="ctr">
-                      <a:solidFill>
-                        <a:schemeClr val="tx1"/>
-                      </a:solidFill>
-                      <a:prstDash val="solid"/>
-                      <a:round/>
-                      <a:headEnd type="none" w="med" len="med"/>
-                      <a:tailEnd type="none" w="med" len="med"/>
-                    </a:lnR>
-                    <a:lnT w="12700" cap="flat" cmpd="sng" algn="ctr">
-                      <a:solidFill>
-                        <a:schemeClr val="tx1"/>
-                      </a:solidFill>
-                      <a:prstDash val="solid"/>
-                      <a:round/>
-                      <a:headEnd type="none" w="med" len="med"/>
-                      <a:tailEnd type="none" w="med" len="med"/>
-                    </a:lnT>
-                    <a:lnB w="12700" cap="flat" cmpd="sng" algn="ctr">
-                      <a:solidFill>
-                        <a:schemeClr val="tx1"/>
-                      </a:solidFill>
-                      <a:prstDash val="solid"/>
-                      <a:round/>
-                      <a:headEnd type="none" w="med" len="med"/>
-                      <a:tailEnd type="none" w="med" len="med"/>
-                    </a:lnB>
-                    <a:lnTlToBr w="12700" cmpd="sng">
-                      <a:noFill/>
-                      <a:prstDash val="solid"/>
-                    </a:lnTlToBr>
-                    <a:lnBlToTr w="12700" cmpd="sng">
-                      <a:noFill/>
-                      <a:prstDash val="solid"/>
-                    </a:lnBlToTr>
-                    <a:solidFill>
-                      <a:schemeClr val="bg1"/>
-                    </a:solidFill>
-                  </a:tcPr>
-                </a:tc>
-                <a:tc>
-                  <a:txBody>
-                    <a:bodyPr/>
-                    <a:lstStyle/>
-                    <a:p>
-                      <a:endParaRPr lang="en-GB"/>
-                    </a:p>
-                  </a:txBody>
-                  <a:tcPr>
-                    <a:lnL w="12700" cap="flat" cmpd="sng" algn="ctr">
-                      <a:solidFill>
-                        <a:schemeClr val="tx1"/>
-                      </a:solidFill>
-                      <a:prstDash val="solid"/>
-                      <a:round/>
-                      <a:headEnd type="none" w="med" len="med"/>
-                      <a:tailEnd type="none" w="med" len="med"/>
-                    </a:lnL>
-                    <a:lnR w="12700" cap="flat" cmpd="sng" algn="ctr">
-                      <a:solidFill>
-                        <a:schemeClr val="tx1"/>
-                      </a:solidFill>
-                      <a:prstDash val="solid"/>
-                      <a:round/>
-                      <a:headEnd type="none" w="med" len="med"/>
-                      <a:tailEnd type="none" w="med" len="med"/>
-                    </a:lnR>
-                    <a:lnT w="12700" cap="flat" cmpd="sng" algn="ctr">
-                      <a:solidFill>
-                        <a:schemeClr val="tx1"/>
-                      </a:solidFill>
-                      <a:prstDash val="solid"/>
-                      <a:round/>
-                      <a:headEnd type="none" w="med" len="med"/>
-                      <a:tailEnd type="none" w="med" len="med"/>
-                    </a:lnT>
-                    <a:lnB w="12700" cap="flat" cmpd="sng" algn="ctr">
-                      <a:solidFill>
-                        <a:schemeClr val="tx1"/>
-                      </a:solidFill>
-                      <a:prstDash val="solid"/>
-                      <a:round/>
-                      <a:headEnd type="none" w="med" len="med"/>
-                      <a:tailEnd type="none" w="med" len="med"/>
-                    </a:lnB>
-                    <a:lnTlToBr w="12700" cmpd="sng">
-                      <a:noFill/>
-                      <a:prstDash val="solid"/>
-                    </a:lnTlToBr>
-                    <a:lnBlToTr w="12700" cmpd="sng">
-                      <a:noFill/>
-                      <a:prstDash val="solid"/>
-                    </a:lnBlToTr>
-                    <a:solidFill>
-                      <a:schemeClr val="bg1"/>
-                    </a:solidFill>
-                  </a:tcPr>
-                </a:tc>
-                <a:extLst>
-                  <a:ext uri="{0D108BD9-81ED-4DB2-BD59-A6C34878D82A}">
-                    <a16:rowId xmlns:a16="http://schemas.microsoft.com/office/drawing/2014/main" val="638632619"/>
-                  </a:ext>
-                </a:extLst>
-              </a:tr>
-              <a:tr h="370840">
-                <a:tc>
-                  <a:txBody>
-                    <a:bodyPr/>
-                    <a:lstStyle/>
-                    <a:p>
-                      <a:endParaRPr lang="en-GB"/>
-                    </a:p>
-                  </a:txBody>
-                  <a:tcPr>
-                    <a:lnL w="12700" cap="flat" cmpd="sng" algn="ctr">
-                      <a:solidFill>
-                        <a:schemeClr val="tx1"/>
-                      </a:solidFill>
-                      <a:prstDash val="solid"/>
-                      <a:round/>
-                      <a:headEnd type="none" w="med" len="med"/>
-                      <a:tailEnd type="none" w="med" len="med"/>
-                    </a:lnL>
-                    <a:lnR w="12700" cap="flat" cmpd="sng" algn="ctr">
-                      <a:solidFill>
-                        <a:schemeClr val="tx1"/>
-                      </a:solidFill>
-                      <a:prstDash val="solid"/>
-                      <a:round/>
-                      <a:headEnd type="none" w="med" len="med"/>
-                      <a:tailEnd type="none" w="med" len="med"/>
-                    </a:lnR>
-                    <a:lnT w="12700" cap="flat" cmpd="sng" algn="ctr">
-                      <a:solidFill>
-                        <a:schemeClr val="tx1"/>
-                      </a:solidFill>
-                      <a:prstDash val="solid"/>
-                      <a:round/>
-                      <a:headEnd type="none" w="med" len="med"/>
-                      <a:tailEnd type="none" w="med" len="med"/>
-                    </a:lnT>
-                    <a:lnB w="12700" cap="flat" cmpd="sng" algn="ctr">
-                      <a:solidFill>
-                        <a:schemeClr val="tx1"/>
-                      </a:solidFill>
-                      <a:prstDash val="solid"/>
-                      <a:round/>
-                      <a:headEnd type="none" w="med" len="med"/>
-                      <a:tailEnd type="none" w="med" len="med"/>
-                    </a:lnB>
-                    <a:lnTlToBr w="12700" cmpd="sng">
-                      <a:noFill/>
-                      <a:prstDash val="solid"/>
-                    </a:lnTlToBr>
-                    <a:lnBlToTr w="12700" cmpd="sng">
-                      <a:noFill/>
-                      <a:prstDash val="solid"/>
-                    </a:lnBlToTr>
-                    <a:solidFill>
-                      <a:schemeClr val="bg1"/>
-                    </a:solidFill>
-                  </a:tcPr>
-                </a:tc>
-                <a:tc>
-                  <a:txBody>
-                    <a:bodyPr/>
-                    <a:lstStyle/>
-                    <a:p>
-                      <a:endParaRPr lang="en-GB" dirty="0"/>
-                    </a:p>
-                  </a:txBody>
-                  <a:tcPr>
-                    <a:lnL w="12700" cap="flat" cmpd="sng" algn="ctr">
-                      <a:solidFill>
-                        <a:schemeClr val="tx1"/>
-                      </a:solidFill>
-                      <a:prstDash val="solid"/>
-                      <a:round/>
-                      <a:headEnd type="none" w="med" len="med"/>
-                      <a:tailEnd type="none" w="med" len="med"/>
-                    </a:lnL>
-                    <a:lnR w="12700" cap="flat" cmpd="sng" algn="ctr">
-                      <a:solidFill>
-                        <a:schemeClr val="tx1"/>
-                      </a:solidFill>
-                      <a:prstDash val="solid"/>
-                      <a:round/>
-                      <a:headEnd type="none" w="med" len="med"/>
-                      <a:tailEnd type="none" w="med" len="med"/>
-                    </a:lnR>
-                    <a:lnT w="12700" cap="flat" cmpd="sng" algn="ctr">
-                      <a:solidFill>
-                        <a:schemeClr val="tx1"/>
-                      </a:solidFill>
-                      <a:prstDash val="solid"/>
-                      <a:round/>
-                      <a:headEnd type="none" w="med" len="med"/>
-                      <a:tailEnd type="none" w="med" len="med"/>
-                    </a:lnT>
-                    <a:lnB w="12700" cap="flat" cmpd="sng" algn="ctr">
-                      <a:solidFill>
-                        <a:schemeClr val="tx1"/>
-                      </a:solidFill>
-                      <a:prstDash val="solid"/>
-                      <a:round/>
-                      <a:headEnd type="none" w="med" len="med"/>
-                      <a:tailEnd type="none" w="med" len="med"/>
-                    </a:lnB>
-                    <a:lnTlToBr w="12700" cmpd="sng">
-                      <a:noFill/>
-                      <a:prstDash val="solid"/>
-                    </a:lnTlToBr>
-                    <a:lnBlToTr w="12700" cmpd="sng">
-                      <a:noFill/>
-                      <a:prstDash val="solid"/>
-                    </a:lnBlToTr>
-                    <a:solidFill>
-                      <a:schemeClr val="bg1"/>
-                    </a:solidFill>
-                  </a:tcPr>
-                </a:tc>
-                <a:extLst>
-                  <a:ext uri="{0D108BD9-81ED-4DB2-BD59-A6C34878D82A}">
-                    <a16:rowId xmlns:a16="http://schemas.microsoft.com/office/drawing/2014/main" val="142771991"/>
                   </a:ext>
                 </a:extLst>
               </a:tr>
@@ -4886,6 +5611,14 @@
 <file path=ppt/slides/slide4.xml><?xml version="1.0" encoding="utf-8"?>
 <p:sld xmlns:a="http://schemas.openxmlformats.org/drawingml/2006/main" xmlns:r="http://schemas.openxmlformats.org/officeDocument/2006/relationships" xmlns:p="http://schemas.openxmlformats.org/presentationml/2006/main">
   <p:cSld>
+    <p:bg>
+      <p:bgPr>
+        <a:solidFill>
+          <a:schemeClr val="bg1"/>
+        </a:solidFill>
+        <a:effectLst/>
+      </p:bgPr>
+    </p:bg>
     <p:spTree>
       <p:nvGrpSpPr>
         <p:cNvPr id="1" name=""/>
@@ -4900,6 +5633,355 @@
           <a:chExt cx="0" cy="0"/>
         </a:xfrm>
       </p:grpSpPr>
+      <p:sp useBgFill="1">
+        <p:nvSpPr>
+          <p:cNvPr id="20" name="Rectangle 19">
+            <a:extLst>
+              <a:ext uri="{FF2B5EF4-FFF2-40B4-BE49-F238E27FC236}">
+                <a16:creationId xmlns:a16="http://schemas.microsoft.com/office/drawing/2014/main" id="{9D25F302-27C5-414F-97F8-6EA0A6C028BA}"/>
+              </a:ext>
+              <a:ext uri="{C183D7F6-B498-43B3-948B-1728B52AA6E4}">
+                <adec:decorative xmlns:adec="http://schemas.microsoft.com/office/drawing/2017/decorative" val="1"/>
+              </a:ext>
+            </a:extLst>
+          </p:cNvPr>
+          <p:cNvSpPr>
+            <a:spLocks noGrp="1" noRot="1" noChangeAspect="1" noMove="1" noResize="1" noEditPoints="1" noAdjustHandles="1" noChangeArrowheads="1" noChangeShapeType="1" noTextEdit="1"/>
+          </p:cNvSpPr>
+          <p:nvPr>
+            <p:extLst>
+              <p:ext uri="{386F3935-93C4-4BCD-93E2-E3B085C9AB24}">
+                <p16:designElem xmlns:p16="http://schemas.microsoft.com/office/powerpoint/2015/main" val="1"/>
+              </p:ext>
+            </p:extLst>
+          </p:nvPr>
+        </p:nvSpPr>
+        <p:spPr>
+          <a:xfrm>
+            <a:off x="0" y="0"/>
+            <a:ext cx="12192000" cy="6858000"/>
+          </a:xfrm>
+          <a:prstGeom prst="rect">
+            <a:avLst/>
+          </a:prstGeom>
+          <a:ln>
+            <a:noFill/>
+          </a:ln>
+        </p:spPr>
+        <p:style>
+          <a:lnRef idx="2">
+            <a:schemeClr val="accent1">
+              <a:shade val="50000"/>
+            </a:schemeClr>
+          </a:lnRef>
+          <a:fillRef idx="1">
+            <a:schemeClr val="accent1"/>
+          </a:fillRef>
+          <a:effectRef idx="0">
+            <a:schemeClr val="accent1"/>
+          </a:effectRef>
+          <a:fontRef idx="minor">
+            <a:schemeClr val="lt1"/>
+          </a:fontRef>
+        </p:style>
+        <p:txBody>
+          <a:bodyPr rtlCol="0" anchor="ctr"/>
+          <a:lstStyle/>
+          <a:p>
+            <a:pPr algn="ctr"/>
+            <a:endParaRPr lang="en-US" dirty="0"/>
+          </a:p>
+        </p:txBody>
+      </p:sp>
+      <p:sp>
+        <p:nvSpPr>
+          <p:cNvPr id="22" name="Freeform: Shape 21">
+            <a:extLst>
+              <a:ext uri="{FF2B5EF4-FFF2-40B4-BE49-F238E27FC236}">
+                <a16:creationId xmlns:a16="http://schemas.microsoft.com/office/drawing/2014/main" id="{041C67D0-A496-4B86-BF61-263FF9EFD7F0}"/>
+              </a:ext>
+              <a:ext uri="{C183D7F6-B498-43B3-948B-1728B52AA6E4}">
+                <adec:decorative xmlns:adec="http://schemas.microsoft.com/office/drawing/2017/decorative" val="1"/>
+              </a:ext>
+            </a:extLst>
+          </p:cNvPr>
+          <p:cNvSpPr>
+            <a:spLocks noGrp="1" noRot="1" noChangeAspect="1" noMove="1" noResize="1" noEditPoints="1" noAdjustHandles="1" noChangeArrowheads="1" noChangeShapeType="1" noTextEdit="1"/>
+          </p:cNvSpPr>
+          <p:nvPr>
+            <p:extLst>
+              <p:ext uri="{386F3935-93C4-4BCD-93E2-E3B085C9AB24}">
+                <p16:designElem xmlns:p16="http://schemas.microsoft.com/office/powerpoint/2015/main" val="1"/>
+              </p:ext>
+            </p:extLst>
+          </p:nvPr>
+        </p:nvSpPr>
+        <p:spPr>
+          <a:xfrm>
+            <a:off x="5296068" y="320442"/>
+            <a:ext cx="6572492" cy="6212748"/>
+          </a:xfrm>
+          <a:custGeom>
+            <a:avLst/>
+            <a:gdLst>
+              <a:gd name="connsiteX0" fmla="*/ 0 w 6572492"/>
+              <a:gd name="connsiteY0" fmla="*/ 0 h 6212748"/>
+              <a:gd name="connsiteX1" fmla="*/ 2248593 w 6572492"/>
+              <a:gd name="connsiteY1" fmla="*/ 0 h 6212748"/>
+              <a:gd name="connsiteX2" fmla="*/ 2694770 w 6572492"/>
+              <a:gd name="connsiteY2" fmla="*/ 0 h 6212748"/>
+              <a:gd name="connsiteX3" fmla="*/ 2991094 w 6572492"/>
+              <a:gd name="connsiteY3" fmla="*/ 0 h 6212748"/>
+              <a:gd name="connsiteX4" fmla="*/ 6572492 w 6572492"/>
+              <a:gd name="connsiteY4" fmla="*/ 0 h 6212748"/>
+              <a:gd name="connsiteX5" fmla="*/ 6572492 w 6572492"/>
+              <a:gd name="connsiteY5" fmla="*/ 2864954 h 6212748"/>
+              <a:gd name="connsiteX6" fmla="*/ 3129047 w 6572492"/>
+              <a:gd name="connsiteY6" fmla="*/ 6212748 h 6212748"/>
+              <a:gd name="connsiteX7" fmla="*/ 2694770 w 6572492"/>
+              <a:gd name="connsiteY7" fmla="*/ 6212748 h 6212748"/>
+              <a:gd name="connsiteX8" fmla="*/ 2248593 w 6572492"/>
+              <a:gd name="connsiteY8" fmla="*/ 6212748 h 6212748"/>
+              <a:gd name="connsiteX9" fmla="*/ 0 w 6572492"/>
+              <a:gd name="connsiteY9" fmla="*/ 6212748 h 6212748"/>
+            </a:gdLst>
+            <a:ahLst/>
+            <a:cxnLst>
+              <a:cxn ang="0">
+                <a:pos x="connsiteX0" y="connsiteY0"/>
+              </a:cxn>
+              <a:cxn ang="0">
+                <a:pos x="connsiteX1" y="connsiteY1"/>
+              </a:cxn>
+              <a:cxn ang="0">
+                <a:pos x="connsiteX2" y="connsiteY2"/>
+              </a:cxn>
+              <a:cxn ang="0">
+                <a:pos x="connsiteX3" y="connsiteY3"/>
+              </a:cxn>
+              <a:cxn ang="0">
+                <a:pos x="connsiteX4" y="connsiteY4"/>
+              </a:cxn>
+              <a:cxn ang="0">
+                <a:pos x="connsiteX5" y="connsiteY5"/>
+              </a:cxn>
+              <a:cxn ang="0">
+                <a:pos x="connsiteX6" y="connsiteY6"/>
+              </a:cxn>
+              <a:cxn ang="0">
+                <a:pos x="connsiteX7" y="connsiteY7"/>
+              </a:cxn>
+              <a:cxn ang="0">
+                <a:pos x="connsiteX8" y="connsiteY8"/>
+              </a:cxn>
+              <a:cxn ang="0">
+                <a:pos x="connsiteX9" y="connsiteY9"/>
+              </a:cxn>
+            </a:cxnLst>
+            <a:rect l="l" t="t" r="r" b="b"/>
+            <a:pathLst>
+              <a:path w="6572492" h="6212748">
+                <a:moveTo>
+                  <a:pt x="0" y="0"/>
+                </a:moveTo>
+                <a:lnTo>
+                  <a:pt x="2248593" y="0"/>
+                </a:lnTo>
+                <a:lnTo>
+                  <a:pt x="2694770" y="0"/>
+                </a:lnTo>
+                <a:lnTo>
+                  <a:pt x="2991094" y="0"/>
+                </a:lnTo>
+                <a:lnTo>
+                  <a:pt x="6572492" y="0"/>
+                </a:lnTo>
+                <a:lnTo>
+                  <a:pt x="6572492" y="2864954"/>
+                </a:lnTo>
+                <a:lnTo>
+                  <a:pt x="3129047" y="6212748"/>
+                </a:lnTo>
+                <a:lnTo>
+                  <a:pt x="2694770" y="6212748"/>
+                </a:lnTo>
+                <a:lnTo>
+                  <a:pt x="2248593" y="6212748"/>
+                </a:lnTo>
+                <a:lnTo>
+                  <a:pt x="0" y="6212748"/>
+                </a:lnTo>
+                <a:close/>
+              </a:path>
+            </a:pathLst>
+          </a:custGeom>
+          <a:solidFill>
+            <a:schemeClr val="tx1">
+              <a:lumMod val="50000"/>
+              <a:lumOff val="50000"/>
+              <a:alpha val="25000"/>
+            </a:schemeClr>
+          </a:solidFill>
+          <a:ln>
+            <a:noFill/>
+          </a:ln>
+        </p:spPr>
+        <p:style>
+          <a:lnRef idx="2">
+            <a:schemeClr val="accent1">
+              <a:shade val="50000"/>
+            </a:schemeClr>
+          </a:lnRef>
+          <a:fillRef idx="1">
+            <a:schemeClr val="accent1"/>
+          </a:fillRef>
+          <a:effectRef idx="0">
+            <a:schemeClr val="accent1"/>
+          </a:effectRef>
+          <a:fontRef idx="minor">
+            <a:schemeClr val="lt1"/>
+          </a:fontRef>
+        </p:style>
+        <p:txBody>
+          <a:bodyPr wrap="square" rtlCol="0" anchor="ctr">
+            <a:noAutofit/>
+          </a:bodyPr>
+          <a:lstStyle/>
+          <a:p>
+            <a:pPr algn="ctr"/>
+            <a:endParaRPr lang="en-US" dirty="0"/>
+          </a:p>
+        </p:txBody>
+      </p:sp>
+      <p:sp>
+        <p:nvSpPr>
+          <p:cNvPr id="24" name="Right Triangle 23">
+            <a:extLst>
+              <a:ext uri="{FF2B5EF4-FFF2-40B4-BE49-F238E27FC236}">
+                <a16:creationId xmlns:a16="http://schemas.microsoft.com/office/drawing/2014/main" id="{830A36F8-48C2-4842-A87B-8CE8DF4E7FD2}"/>
+              </a:ext>
+              <a:ext uri="{C183D7F6-B498-43B3-948B-1728B52AA6E4}">
+                <adec:decorative xmlns:adec="http://schemas.microsoft.com/office/drawing/2017/decorative" val="1"/>
+              </a:ext>
+            </a:extLst>
+          </p:cNvPr>
+          <p:cNvSpPr>
+            <a:spLocks noGrp="1" noRot="1" noChangeAspect="1" noMove="1" noResize="1" noEditPoints="1" noAdjustHandles="1" noChangeArrowheads="1" noChangeShapeType="1" noTextEdit="1"/>
+          </p:cNvSpPr>
+          <p:nvPr>
+            <p:extLst>
+              <p:ext uri="{386F3935-93C4-4BCD-93E2-E3B085C9AB24}">
+                <p16:designElem xmlns:p16="http://schemas.microsoft.com/office/powerpoint/2015/main" val="1"/>
+              </p:ext>
+            </p:extLst>
+          </p:nvPr>
+        </p:nvSpPr>
+        <p:spPr>
+          <a:xfrm flipH="1">
+            <a:off x="8576720" y="3335867"/>
+            <a:ext cx="3291840" cy="3200400"/>
+          </a:xfrm>
+          <a:prstGeom prst="rtTriangle">
+            <a:avLst/>
+          </a:prstGeom>
+          <a:solidFill>
+            <a:schemeClr val="accent4"/>
+          </a:solidFill>
+          <a:ln>
+            <a:noFill/>
+          </a:ln>
+        </p:spPr>
+        <p:style>
+          <a:lnRef idx="2">
+            <a:schemeClr val="accent1">
+              <a:shade val="50000"/>
+            </a:schemeClr>
+          </a:lnRef>
+          <a:fillRef idx="1">
+            <a:schemeClr val="accent1"/>
+          </a:fillRef>
+          <a:effectRef idx="0">
+            <a:schemeClr val="accent1"/>
+          </a:effectRef>
+          <a:fontRef idx="minor">
+            <a:schemeClr val="lt1"/>
+          </a:fontRef>
+        </p:style>
+        <p:txBody>
+          <a:bodyPr rtlCol="0" anchor="ctr"/>
+          <a:lstStyle/>
+          <a:p>
+            <a:pPr algn="ctr"/>
+            <a:endParaRPr lang="en-US" dirty="0"/>
+          </a:p>
+        </p:txBody>
+      </p:sp>
+      <p:sp>
+        <p:nvSpPr>
+          <p:cNvPr id="26" name="Rectangle 25">
+            <a:extLst>
+              <a:ext uri="{FF2B5EF4-FFF2-40B4-BE49-F238E27FC236}">
+                <a16:creationId xmlns:a16="http://schemas.microsoft.com/office/drawing/2014/main" id="{8F451A30-466B-4996-9BA5-CD6ABCC6D558}"/>
+              </a:ext>
+              <a:ext uri="{C183D7F6-B498-43B3-948B-1728B52AA6E4}">
+                <adec:decorative xmlns:adec="http://schemas.microsoft.com/office/drawing/2017/decorative" val="1"/>
+              </a:ext>
+            </a:extLst>
+          </p:cNvPr>
+          <p:cNvSpPr>
+            <a:spLocks noGrp="1" noRot="1" noChangeAspect="1" noMove="1" noResize="1" noEditPoints="1" noAdjustHandles="1" noChangeArrowheads="1" noChangeShapeType="1" noTextEdit="1"/>
+          </p:cNvSpPr>
+          <p:nvPr>
+            <p:extLst>
+              <p:ext uri="{386F3935-93C4-4BCD-93E2-E3B085C9AB24}">
+                <p16:designElem xmlns:p16="http://schemas.microsoft.com/office/powerpoint/2015/main" val="1"/>
+              </p:ext>
+            </p:extLst>
+          </p:nvPr>
+        </p:nvSpPr>
+        <p:spPr>
+          <a:xfrm>
+            <a:off x="641774" y="623275"/>
+            <a:ext cx="10905053" cy="5607882"/>
+          </a:xfrm>
+          <a:prstGeom prst="rect">
+            <a:avLst/>
+          </a:prstGeom>
+          <a:noFill/>
+          <a:ln w="19050">
+            <a:solidFill>
+              <a:schemeClr val="tx1">
+                <a:lumMod val="75000"/>
+                <a:lumOff val="25000"/>
+              </a:schemeClr>
+            </a:solidFill>
+          </a:ln>
+        </p:spPr>
+        <p:style>
+          <a:lnRef idx="2">
+            <a:schemeClr val="accent1">
+              <a:shade val="50000"/>
+            </a:schemeClr>
+          </a:lnRef>
+          <a:fillRef idx="1">
+            <a:schemeClr val="accent1"/>
+          </a:fillRef>
+          <a:effectRef idx="0">
+            <a:schemeClr val="accent1"/>
+          </a:effectRef>
+          <a:fontRef idx="minor">
+            <a:schemeClr val="lt1"/>
+          </a:fontRef>
+        </p:style>
+        <p:txBody>
+          <a:bodyPr rtlCol="0" anchor="ctr"/>
+          <a:lstStyle/>
+          <a:p>
+            <a:pPr algn="ctr"/>
+            <a:endParaRPr lang="en-US" dirty="0"/>
+          </a:p>
+        </p:txBody>
+      </p:sp>
       <p:sp>
         <p:nvSpPr>
           <p:cNvPr id="2" name="Title 1">
@@ -4916,42 +5998,39 @@
             <p:ph type="title"/>
           </p:nvPr>
         </p:nvSpPr>
-        <p:spPr/>
-        <p:txBody>
-          <a:bodyPr/>
-          <a:lstStyle/>
-          <a:p>
-            <a:r>
-              <a:rPr lang="pl-PL" dirty="0" err="1"/>
-              <a:t>Perspective</a:t>
-            </a:r>
-            <a:r>
-              <a:rPr lang="pl-PL" dirty="0"/>
-              <a:t> </a:t>
-            </a:r>
-            <a:r>
-              <a:rPr lang="pl-PL" dirty="0" err="1"/>
-              <a:t>transformation</a:t>
-            </a:r>
-            <a:endParaRPr lang="en-GB" dirty="0"/>
+        <p:spPr>
+          <a:xfrm>
+            <a:off x="5780700" y="1188637"/>
+            <a:ext cx="5327272" cy="1642850"/>
+          </a:xfrm>
+        </p:spPr>
+        <p:txBody>
+          <a:bodyPr vert="horz" lIns="91440" tIns="45720" rIns="91440" bIns="45720" rtlCol="0" anchor="ctr">
+            <a:normAutofit/>
+          </a:bodyPr>
+          <a:lstStyle/>
+          <a:p>
+            <a:pPr algn="r"/>
+            <a:r>
+              <a:rPr lang="en-US" sz="5400" b="1" dirty="0"/>
+              <a:t>Perspective transformation</a:t>
+            </a:r>
           </a:p>
         </p:txBody>
       </p:sp>
       <p:pic>
         <p:nvPicPr>
-          <p:cNvPr id="5" name="Content Placeholder 4">
-            <a:extLst>
-              <a:ext uri="{FF2B5EF4-FFF2-40B4-BE49-F238E27FC236}">
-                <a16:creationId xmlns:a16="http://schemas.microsoft.com/office/drawing/2014/main" id="{CE942844-A446-68F4-C9DD-72B6F0B16C3F}"/>
+          <p:cNvPr id="14" name="Picture 13">
+            <a:extLst>
+              <a:ext uri="{FF2B5EF4-FFF2-40B4-BE49-F238E27FC236}">
+                <a16:creationId xmlns:a16="http://schemas.microsoft.com/office/drawing/2014/main" id="{46890D6D-0032-4B13-D43F-E12D52FDF691}"/>
               </a:ext>
             </a:extLst>
           </p:cNvPr>
           <p:cNvPicPr>
-            <a:picLocks noGrp="1" noChangeAspect="1"/>
+            <a:picLocks noChangeAspect="1"/>
           </p:cNvPicPr>
-          <p:nvPr>
-            <p:ph idx="1"/>
-          </p:nvPr>
+          <p:nvPr/>
         </p:nvPicPr>
         <p:blipFill>
           <a:blip r:embed="rId2"/>
@@ -4961,24 +6040,29 @@
         </p:blipFill>
         <p:spPr>
           <a:xfrm>
-            <a:off x="942256" y="1598593"/>
-            <a:ext cx="10307488" cy="943107"/>
+            <a:off x="802355" y="1719125"/>
+            <a:ext cx="4444400" cy="2411086"/>
           </a:xfrm>
+          <a:prstGeom prst="rect">
+            <a:avLst/>
+          </a:prstGeom>
         </p:spPr>
       </p:pic>
       <p:pic>
         <p:nvPicPr>
-          <p:cNvPr id="14" name="Picture 13">
-            <a:extLst>
-              <a:ext uri="{FF2B5EF4-FFF2-40B4-BE49-F238E27FC236}">
-                <a16:creationId xmlns:a16="http://schemas.microsoft.com/office/drawing/2014/main" id="{46890D6D-0032-4B13-D43F-E12D52FDF691}"/>
+          <p:cNvPr id="5" name="Content Placeholder 4">
+            <a:extLst>
+              <a:ext uri="{FF2B5EF4-FFF2-40B4-BE49-F238E27FC236}">
+                <a16:creationId xmlns:a16="http://schemas.microsoft.com/office/drawing/2014/main" id="{CE942844-A446-68F4-C9DD-72B6F0B16C3F}"/>
               </a:ext>
             </a:extLst>
           </p:cNvPr>
           <p:cNvPicPr>
-            <a:picLocks noChangeAspect="1"/>
+            <a:picLocks noGrp="1" noChangeAspect="1"/>
           </p:cNvPicPr>
-          <p:nvPr/>
+          <p:nvPr>
+            <p:ph idx="1"/>
+          </p:nvPr>
         </p:nvPicPr>
         <p:blipFill>
           <a:blip r:embed="rId3"/>
@@ -4988,8 +6072,8 @@
         </p:blipFill>
         <p:spPr>
           <a:xfrm>
-            <a:off x="5983163" y="2856295"/>
-            <a:ext cx="5370637" cy="2920011"/>
+            <a:off x="686232" y="5215358"/>
+            <a:ext cx="10860595" cy="1004602"/>
           </a:xfrm>
           <a:prstGeom prst="rect">
             <a:avLst/>
@@ -5010,186 +6094,31 @@
         </p:nvSpPr>
         <p:spPr>
           <a:xfrm>
-            <a:off x="942256" y="3071973"/>
-            <a:ext cx="4759901" cy="1631216"/>
+            <a:off x="5780700" y="3086514"/>
+            <a:ext cx="5407857" cy="1852490"/>
           </a:xfrm>
           <a:prstGeom prst="rect">
             <a:avLst/>
           </a:prstGeom>
-          <a:noFill/>
         </p:spPr>
         <p:txBody>
-          <a:bodyPr wrap="square" rtlCol="0">
-            <a:spAutoFit/>
+          <a:bodyPr vert="horz" lIns="91440" tIns="45720" rIns="91440" bIns="45720" rtlCol="0" anchor="t">
+            <a:normAutofit/>
           </a:bodyPr>
           <a:lstStyle/>
           <a:p>
-            <a:pPr algn="just"/>
-            <a:r>
-              <a:rPr lang="pl-PL" sz="2000" dirty="0" err="1"/>
-              <a:t>Transformation</a:t>
-            </a:r>
-            <a:r>
-              <a:rPr lang="pl-PL" sz="2000" dirty="0"/>
-              <a:t> matrix </a:t>
-            </a:r>
-            <a:r>
-              <a:rPr lang="pl-PL" sz="2000" dirty="0" err="1"/>
-              <a:t>is</a:t>
-            </a:r>
-            <a:r>
-              <a:rPr lang="pl-PL" sz="2000" dirty="0"/>
-              <a:t> </a:t>
-            </a:r>
-            <a:r>
-              <a:rPr lang="pl-PL" sz="2000" dirty="0" err="1"/>
-              <a:t>defined</a:t>
-            </a:r>
-            <a:r>
-              <a:rPr lang="pl-PL" sz="2000" dirty="0"/>
-              <a:t> by 8 </a:t>
-            </a:r>
-            <a:r>
-              <a:rPr lang="pl-PL" sz="2000" dirty="0" err="1"/>
-              <a:t>constants</a:t>
-            </a:r>
-            <a:r>
-              <a:rPr lang="pl-PL" sz="2000" dirty="0"/>
-              <a:t>. </a:t>
-            </a:r>
-            <a:r>
-              <a:rPr lang="pl-PL" sz="2000" dirty="0" err="1"/>
-              <a:t>If</a:t>
-            </a:r>
-            <a:r>
-              <a:rPr lang="pl-PL" sz="2000" dirty="0"/>
-              <a:t> we </a:t>
-            </a:r>
-            <a:r>
-              <a:rPr lang="pl-PL" sz="2000" dirty="0" err="1"/>
-              <a:t>know</a:t>
-            </a:r>
-            <a:r>
-              <a:rPr lang="pl-PL" sz="2000" dirty="0"/>
-              <a:t> </a:t>
-            </a:r>
-            <a:r>
-              <a:rPr lang="pl-PL" sz="2000" dirty="0" err="1"/>
-              <a:t>location</a:t>
-            </a:r>
-            <a:r>
-              <a:rPr lang="pl-PL" sz="2000" dirty="0"/>
-              <a:t> of </a:t>
-            </a:r>
-            <a:r>
-              <a:rPr lang="pl-PL" sz="2000" dirty="0" err="1"/>
-              <a:t>at</a:t>
-            </a:r>
-            <a:r>
-              <a:rPr lang="pl-PL" sz="2000" dirty="0"/>
-              <a:t> </a:t>
-            </a:r>
-            <a:r>
-              <a:rPr lang="pl-PL" sz="2000" dirty="0" err="1"/>
-              <a:t>least</a:t>
-            </a:r>
-            <a:r>
-              <a:rPr lang="pl-PL" sz="2000" dirty="0"/>
-              <a:t> 4 the same </a:t>
-            </a:r>
-            <a:r>
-              <a:rPr lang="pl-PL" sz="2000" dirty="0" err="1"/>
-              <a:t>points</a:t>
-            </a:r>
-            <a:r>
-              <a:rPr lang="pl-PL" sz="2000" dirty="0"/>
-              <a:t> in </a:t>
-            </a:r>
-            <a:r>
-              <a:rPr lang="pl-PL" sz="2000" dirty="0" err="1"/>
-              <a:t>both</a:t>
-            </a:r>
-            <a:r>
-              <a:rPr lang="pl-PL" sz="2000" dirty="0"/>
-              <a:t> </a:t>
-            </a:r>
-            <a:r>
-              <a:rPr lang="pl-PL" sz="2000" dirty="0" err="1"/>
-              <a:t>input</a:t>
-            </a:r>
-            <a:r>
-              <a:rPr lang="pl-PL" sz="2000" dirty="0"/>
-              <a:t> and </a:t>
-            </a:r>
-            <a:r>
-              <a:rPr lang="pl-PL" sz="2000" dirty="0" err="1"/>
-              <a:t>output</a:t>
-            </a:r>
-            <a:r>
-              <a:rPr lang="pl-PL" sz="2000" dirty="0"/>
-              <a:t> </a:t>
-            </a:r>
-            <a:r>
-              <a:rPr lang="pl-PL" sz="2000" dirty="0" err="1"/>
-              <a:t>images</a:t>
-            </a:r>
-            <a:r>
-              <a:rPr lang="pl-PL" sz="2000" dirty="0"/>
-              <a:t> we </a:t>
-            </a:r>
-            <a:r>
-              <a:rPr lang="pl-PL" sz="2000" dirty="0" err="1"/>
-              <a:t>get</a:t>
-            </a:r>
-            <a:r>
-              <a:rPr lang="pl-PL" sz="2000" dirty="0"/>
-              <a:t> 8 </a:t>
-            </a:r>
-            <a:r>
-              <a:rPr lang="pl-PL" sz="2000" dirty="0" err="1"/>
-              <a:t>equations</a:t>
-            </a:r>
-            <a:r>
-              <a:rPr lang="pl-PL" sz="2000" dirty="0"/>
-              <a:t> and 8 </a:t>
-            </a:r>
-            <a:r>
-              <a:rPr lang="pl-PL" sz="2000" dirty="0" err="1"/>
-              <a:t>unknowns</a:t>
-            </a:r>
-            <a:r>
-              <a:rPr lang="pl-PL" sz="2000" dirty="0"/>
-              <a:t>, </a:t>
-            </a:r>
-            <a:r>
-              <a:rPr lang="pl-PL" sz="2000" dirty="0" err="1"/>
-              <a:t>what</a:t>
-            </a:r>
-            <a:r>
-              <a:rPr lang="pl-PL" sz="2000" dirty="0"/>
-              <a:t> </a:t>
-            </a:r>
-            <a:r>
-              <a:rPr lang="pl-PL" sz="2000" dirty="0" err="1"/>
-              <a:t>can</a:t>
-            </a:r>
-            <a:r>
-              <a:rPr lang="pl-PL" sz="2000" dirty="0"/>
-              <a:t> be </a:t>
-            </a:r>
-            <a:r>
-              <a:rPr lang="pl-PL" sz="2000" dirty="0" err="1"/>
-              <a:t>easily</a:t>
-            </a:r>
-            <a:r>
-              <a:rPr lang="pl-PL" sz="2000" dirty="0"/>
-              <a:t> </a:t>
-            </a:r>
-            <a:r>
-              <a:rPr lang="pl-PL" sz="2000" dirty="0" err="1"/>
-              <a:t>solved</a:t>
-            </a:r>
-            <a:endParaRPr lang="en-GB" sz="2000" dirty="0"/>
+            <a:pPr algn="just">
+              <a:lnSpc>
+                <a:spcPct val="90000"/>
+              </a:lnSpc>
+              <a:spcAft>
+                <a:spcPts val="600"/>
+              </a:spcAft>
+            </a:pPr>
+            <a:r>
+              <a:rPr lang="en-US" sz="2000" dirty="0"/>
+              <a:t>Transformation matrix is defined by 8 constants. If we know location of at least 4 the same points in both input and output images we get 8 equations and 8 unknowns, what can be easily solved</a:t>
+            </a:r>
           </a:p>
         </p:txBody>
       </p:sp>
@@ -5249,7 +6178,7 @@
               <a:t>Input </a:t>
             </a:r>
             <a:r>
-              <a:rPr lang="pl-PL" dirty="0" err="1"/>
+              <a:rPr lang="en-GB" dirty="0"/>
               <a:t>output</a:t>
             </a:r>
             <a:r>
@@ -5257,10 +6186,9 @@
               <a:t> </a:t>
             </a:r>
             <a:r>
-              <a:rPr lang="pl-PL" dirty="0" err="1"/>
+              <a:rPr lang="en-GB" dirty="0"/>
               <a:t>samples</a:t>
             </a:r>
-            <a:endParaRPr lang="en-GB" dirty="0"/>
           </a:p>
         </p:txBody>
       </p:sp>
@@ -5293,6 +6221,342 @@
     <p:extLst>
       <p:ext uri="{BB962C8B-B14F-4D97-AF65-F5344CB8AC3E}">
         <p14:creationId xmlns:p14="http://schemas.microsoft.com/office/powerpoint/2010/main" val="2041825249"/>
+      </p:ext>
+    </p:extLst>
+  </p:cSld>
+  <p:clrMapOvr>
+    <a:masterClrMapping/>
+  </p:clrMapOvr>
+</p:sld>
+</file>
+
+<file path=ppt/slides/slide6.xml><?xml version="1.0" encoding="utf-8"?>
+<p:sld xmlns:a="http://schemas.openxmlformats.org/drawingml/2006/main" xmlns:r="http://schemas.openxmlformats.org/officeDocument/2006/relationships" xmlns:p="http://schemas.openxmlformats.org/presentationml/2006/main">
+  <p:cSld>
+    <p:bg>
+      <p:bgPr>
+        <a:solidFill>
+          <a:schemeClr val="bg1"/>
+        </a:solidFill>
+        <a:effectLst/>
+      </p:bgPr>
+    </p:bg>
+    <p:spTree>
+      <p:nvGrpSpPr>
+        <p:cNvPr id="1" name=""/>
+        <p:cNvGrpSpPr/>
+        <p:nvPr/>
+      </p:nvGrpSpPr>
+      <p:grpSpPr>
+        <a:xfrm>
+          <a:off x="0" y="0"/>
+          <a:ext cx="0" cy="0"/>
+          <a:chOff x="0" y="0"/>
+          <a:chExt cx="0" cy="0"/>
+        </a:xfrm>
+      </p:grpSpPr>
+      <p:sp useBgFill="1">
+        <p:nvSpPr>
+          <p:cNvPr id="8" name="Rectangle 7">
+            <a:extLst>
+              <a:ext uri="{FF2B5EF4-FFF2-40B4-BE49-F238E27FC236}">
+                <a16:creationId xmlns:a16="http://schemas.microsoft.com/office/drawing/2014/main" id="{081EA652-8C6A-4E69-BEB9-170809474553}"/>
+              </a:ext>
+              <a:ext uri="{C183D7F6-B498-43B3-948B-1728B52AA6E4}">
+                <adec:decorative xmlns:adec="http://schemas.microsoft.com/office/drawing/2017/decorative" val="1"/>
+              </a:ext>
+            </a:extLst>
+          </p:cNvPr>
+          <p:cNvSpPr>
+            <a:spLocks noGrp="1" noRot="1" noChangeAspect="1" noMove="1" noResize="1" noEditPoints="1" noAdjustHandles="1" noChangeArrowheads="1" noChangeShapeType="1" noTextEdit="1"/>
+          </p:cNvSpPr>
+          <p:nvPr>
+            <p:extLst>
+              <p:ext uri="{386F3935-93C4-4BCD-93E2-E3B085C9AB24}">
+                <p16:designElem xmlns:p16="http://schemas.microsoft.com/office/powerpoint/2015/main" val="1"/>
+              </p:ext>
+            </p:extLst>
+          </p:nvPr>
+        </p:nvSpPr>
+        <p:spPr>
+          <a:xfrm>
+            <a:off x="0" y="0"/>
+            <a:ext cx="12192000" cy="6858000"/>
+          </a:xfrm>
+          <a:prstGeom prst="rect">
+            <a:avLst/>
+          </a:prstGeom>
+          <a:ln>
+            <a:noFill/>
+          </a:ln>
+        </p:spPr>
+        <p:style>
+          <a:lnRef idx="2">
+            <a:schemeClr val="accent1">
+              <a:shade val="50000"/>
+            </a:schemeClr>
+          </a:lnRef>
+          <a:fillRef idx="1">
+            <a:schemeClr val="accent1"/>
+          </a:fillRef>
+          <a:effectRef idx="0">
+            <a:schemeClr val="accent1"/>
+          </a:effectRef>
+          <a:fontRef idx="minor">
+            <a:schemeClr val="lt1"/>
+          </a:fontRef>
+        </p:style>
+        <p:txBody>
+          <a:bodyPr rtlCol="0" anchor="ctr"/>
+          <a:lstStyle/>
+          <a:p>
+            <a:pPr algn="ctr"/>
+            <a:endParaRPr lang="en-US"/>
+          </a:p>
+        </p:txBody>
+      </p:sp>
+      <p:sp>
+        <p:nvSpPr>
+          <p:cNvPr id="10" name="Right Triangle 9">
+            <a:extLst>
+              <a:ext uri="{FF2B5EF4-FFF2-40B4-BE49-F238E27FC236}">
+                <a16:creationId xmlns:a16="http://schemas.microsoft.com/office/drawing/2014/main" id="{5298780A-33B9-4EA2-8F67-DE68AD62841B}"/>
+              </a:ext>
+              <a:ext uri="{C183D7F6-B498-43B3-948B-1728B52AA6E4}">
+                <adec:decorative xmlns:adec="http://schemas.microsoft.com/office/drawing/2017/decorative" val="1"/>
+              </a:ext>
+            </a:extLst>
+          </p:cNvPr>
+          <p:cNvSpPr>
+            <a:spLocks noGrp="1" noRot="1" noChangeAspect="1" noMove="1" noResize="1" noEditPoints="1" noAdjustHandles="1" noChangeArrowheads="1" noChangeShapeType="1" noTextEdit="1"/>
+          </p:cNvSpPr>
+          <p:nvPr>
+            <p:extLst>
+              <p:ext uri="{386F3935-93C4-4BCD-93E2-E3B085C9AB24}">
+                <p16:designElem xmlns:p16="http://schemas.microsoft.com/office/powerpoint/2015/main" val="1"/>
+              </p:ext>
+            </p:extLst>
+          </p:nvPr>
+        </p:nvSpPr>
+        <p:spPr>
+          <a:xfrm flipH="1">
+            <a:off x="8576720" y="3335867"/>
+            <a:ext cx="3291840" cy="3200400"/>
+          </a:xfrm>
+          <a:prstGeom prst="rtTriangle">
+            <a:avLst/>
+          </a:prstGeom>
+          <a:solidFill>
+            <a:schemeClr val="accent4"/>
+          </a:solidFill>
+          <a:ln>
+            <a:noFill/>
+          </a:ln>
+        </p:spPr>
+        <p:style>
+          <a:lnRef idx="2">
+            <a:schemeClr val="accent1">
+              <a:shade val="50000"/>
+            </a:schemeClr>
+          </a:lnRef>
+          <a:fillRef idx="1">
+            <a:schemeClr val="accent1"/>
+          </a:fillRef>
+          <a:effectRef idx="0">
+            <a:schemeClr val="accent1"/>
+          </a:effectRef>
+          <a:fontRef idx="minor">
+            <a:schemeClr val="lt1"/>
+          </a:fontRef>
+        </p:style>
+        <p:txBody>
+          <a:bodyPr rtlCol="0" anchor="ctr"/>
+          <a:lstStyle/>
+          <a:p>
+            <a:pPr algn="ctr"/>
+            <a:endParaRPr lang="en-US" dirty="0"/>
+          </a:p>
+        </p:txBody>
+      </p:sp>
+      <p:sp>
+        <p:nvSpPr>
+          <p:cNvPr id="12" name="Rectangle 11">
+            <a:extLst>
+              <a:ext uri="{FF2B5EF4-FFF2-40B4-BE49-F238E27FC236}">
+                <a16:creationId xmlns:a16="http://schemas.microsoft.com/office/drawing/2014/main" id="{7F488E8B-4E1E-4402-8935-D4E6C02615C7}"/>
+              </a:ext>
+              <a:ext uri="{C183D7F6-B498-43B3-948B-1728B52AA6E4}">
+                <adec:decorative xmlns:adec="http://schemas.microsoft.com/office/drawing/2017/decorative" val="1"/>
+              </a:ext>
+            </a:extLst>
+          </p:cNvPr>
+          <p:cNvSpPr>
+            <a:spLocks noGrp="1" noRot="1" noChangeAspect="1" noMove="1" noResize="1" noEditPoints="1" noAdjustHandles="1" noChangeArrowheads="1" noChangeShapeType="1" noTextEdit="1"/>
+          </p:cNvSpPr>
+          <p:nvPr>
+            <p:extLst>
+              <p:ext uri="{386F3935-93C4-4BCD-93E2-E3B085C9AB24}">
+                <p16:designElem xmlns:p16="http://schemas.microsoft.com/office/powerpoint/2015/main" val="1"/>
+              </p:ext>
+            </p:extLst>
+          </p:nvPr>
+        </p:nvSpPr>
+        <p:spPr>
+          <a:xfrm>
+            <a:off x="641774" y="623275"/>
+            <a:ext cx="10905053" cy="5607882"/>
+          </a:xfrm>
+          <a:prstGeom prst="rect">
+            <a:avLst/>
+          </a:prstGeom>
+          <a:noFill/>
+          <a:ln w="19050">
+            <a:solidFill>
+              <a:schemeClr val="tx1">
+                <a:lumMod val="75000"/>
+                <a:lumOff val="25000"/>
+              </a:schemeClr>
+            </a:solidFill>
+          </a:ln>
+        </p:spPr>
+        <p:style>
+          <a:lnRef idx="2">
+            <a:schemeClr val="accent1">
+              <a:shade val="50000"/>
+            </a:schemeClr>
+          </a:lnRef>
+          <a:fillRef idx="1">
+            <a:schemeClr val="accent1"/>
+          </a:fillRef>
+          <a:effectRef idx="0">
+            <a:schemeClr val="accent1"/>
+          </a:effectRef>
+          <a:fontRef idx="minor">
+            <a:schemeClr val="lt1"/>
+          </a:fontRef>
+        </p:style>
+        <p:txBody>
+          <a:bodyPr rtlCol="0" anchor="ctr"/>
+          <a:lstStyle/>
+          <a:p>
+            <a:pPr algn="ctr"/>
+            <a:endParaRPr lang="en-US"/>
+          </a:p>
+        </p:txBody>
+      </p:sp>
+      <p:sp>
+        <p:nvSpPr>
+          <p:cNvPr id="2" name="Title 1">
+            <a:extLst>
+              <a:ext uri="{FF2B5EF4-FFF2-40B4-BE49-F238E27FC236}">
+                <a16:creationId xmlns:a16="http://schemas.microsoft.com/office/drawing/2014/main" id="{0CE4E1F4-69A7-BC56-F6A5-91A55C30EEFE}"/>
+              </a:ext>
+            </a:extLst>
+          </p:cNvPr>
+          <p:cNvSpPr>
+            <a:spLocks noGrp="1"/>
+          </p:cNvSpPr>
+          <p:nvPr>
+            <p:ph type="title"/>
+          </p:nvPr>
+        </p:nvSpPr>
+        <p:spPr>
+          <a:xfrm>
+            <a:off x="1285240" y="1050595"/>
+            <a:ext cx="8074815" cy="1618489"/>
+          </a:xfrm>
+        </p:spPr>
+        <p:txBody>
+          <a:bodyPr anchor="ctr">
+            <a:normAutofit/>
+          </a:bodyPr>
+          <a:lstStyle/>
+          <a:p>
+            <a:r>
+              <a:rPr lang="pl-PL" sz="6700"/>
+              <a:t>Future improvements</a:t>
+            </a:r>
+            <a:endParaRPr lang="en-GB" sz="6700"/>
+          </a:p>
+        </p:txBody>
+      </p:sp>
+      <p:sp>
+        <p:nvSpPr>
+          <p:cNvPr id="3" name="Content Placeholder 2">
+            <a:extLst>
+              <a:ext uri="{FF2B5EF4-FFF2-40B4-BE49-F238E27FC236}">
+                <a16:creationId xmlns:a16="http://schemas.microsoft.com/office/drawing/2014/main" id="{670488B0-CC94-6C50-F4D3-C6E37C9A3CB7}"/>
+              </a:ext>
+            </a:extLst>
+          </p:cNvPr>
+          <p:cNvSpPr>
+            <a:spLocks noGrp="1"/>
+          </p:cNvSpPr>
+          <p:nvPr>
+            <p:ph idx="1"/>
+          </p:nvPr>
+        </p:nvSpPr>
+        <p:spPr>
+          <a:xfrm>
+            <a:off x="1285240" y="2969469"/>
+            <a:ext cx="8074815" cy="2800395"/>
+          </a:xfrm>
+        </p:spPr>
+        <p:txBody>
+          <a:bodyPr anchor="t">
+            <a:normAutofit/>
+          </a:bodyPr>
+          <a:lstStyle/>
+          <a:p>
+            <a:pPr marL="514350" indent="-514350">
+              <a:buFont typeface="+mj-lt"/>
+              <a:buAutoNum type="arabicPeriod"/>
+            </a:pPr>
+            <a:r>
+              <a:rPr lang="pl-PL" sz="2400"/>
+              <a:t>Applying better resolution camera</a:t>
+            </a:r>
+          </a:p>
+          <a:p>
+            <a:pPr marL="514350" indent="-514350">
+              <a:buFont typeface="+mj-lt"/>
+              <a:buAutoNum type="arabicPeriod"/>
+            </a:pPr>
+            <a:r>
+              <a:rPr lang="pl-PL" sz="2400"/>
+              <a:t>More accurate computation of the output image size (by now camera has to be on the plane parrarel to the document)</a:t>
+            </a:r>
+          </a:p>
+          <a:p>
+            <a:pPr marL="514350" indent="-514350">
+              <a:buFont typeface="+mj-lt"/>
+              <a:buAutoNum type="arabicPeriod"/>
+            </a:pPr>
+            <a:r>
+              <a:rPr lang="pl-PL" sz="2400"/>
+              <a:t>Creating a version for colour images</a:t>
+            </a:r>
+          </a:p>
+          <a:p>
+            <a:pPr marL="514350" indent="-514350">
+              <a:buFont typeface="+mj-lt"/>
+              <a:buAutoNum type="arabicPeriod"/>
+            </a:pPr>
+            <a:endParaRPr lang="pl-PL" sz="2400"/>
+          </a:p>
+          <a:p>
+            <a:pPr marL="514350" indent="-514350">
+              <a:buFont typeface="+mj-lt"/>
+              <a:buAutoNum type="arabicPeriod"/>
+            </a:pPr>
+            <a:endParaRPr lang="en-GB" sz="2400"/>
+          </a:p>
+        </p:txBody>
+      </p:sp>
+    </p:spTree>
+    <p:extLst>
+      <p:ext uri="{BB962C8B-B14F-4D97-AF65-F5344CB8AC3E}">
+        <p14:creationId xmlns:p14="http://schemas.microsoft.com/office/powerpoint/2010/main" val="3444691788"/>
       </p:ext>
     </p:extLst>
   </p:cSld>

</xml_diff>